<commit_message>
fixing seed problem mentioned in the peer review
</commit_message>
<xml_diff>
--- a/Assignment 1.pptx
+++ b/Assignment 1.pptx
@@ -5,10 +5,10 @@
     <p:sldMasterId id="2147483648" r:id="rId1"/>
   </p:sldMasterIdLst>
   <p:notesMasterIdLst>
-    <p:notesMasterId r:id="rId23"/>
+    <p:notesMasterId r:id="rId25"/>
   </p:notesMasterIdLst>
   <p:handoutMasterIdLst>
-    <p:handoutMasterId r:id="rId24"/>
+    <p:handoutMasterId r:id="rId26"/>
   </p:handoutMasterIdLst>
   <p:sldIdLst>
     <p:sldId id="261" r:id="rId2"/>
@@ -24,14 +24,16 @@
     <p:sldId id="274" r:id="rId12"/>
     <p:sldId id="275" r:id="rId13"/>
     <p:sldId id="276" r:id="rId14"/>
-    <p:sldId id="277" r:id="rId15"/>
-    <p:sldId id="278" r:id="rId16"/>
-    <p:sldId id="279" r:id="rId17"/>
-    <p:sldId id="282" r:id="rId18"/>
-    <p:sldId id="281" r:id="rId19"/>
-    <p:sldId id="264" r:id="rId20"/>
-    <p:sldId id="265" r:id="rId21"/>
-    <p:sldId id="280" r:id="rId22"/>
+    <p:sldId id="283" r:id="rId15"/>
+    <p:sldId id="284" r:id="rId16"/>
+    <p:sldId id="277" r:id="rId17"/>
+    <p:sldId id="278" r:id="rId18"/>
+    <p:sldId id="279" r:id="rId19"/>
+    <p:sldId id="282" r:id="rId20"/>
+    <p:sldId id="281" r:id="rId21"/>
+    <p:sldId id="264" r:id="rId22"/>
+    <p:sldId id="265" r:id="rId23"/>
+    <p:sldId id="280" r:id="rId24"/>
   </p:sldIdLst>
   <p:sldSz cx="12192000" cy="6858000"/>
   <p:notesSz cx="6858000" cy="9144000"/>
@@ -234,7 +236,7 @@
           <a:p>
             <a:fld id="{59041DB8-B66F-4DC8-A96E-33677E0F90FF}" type="datetimeFigureOut">
               <a:rPr lang="en-US" smtClean="0"/>
-              <a:t>1/30/2026</a:t>
+              <a:t>1/31/2026</a:t>
             </a:fld>
             <a:endParaRPr lang="en-US"/>
           </a:p>
@@ -399,7 +401,7 @@
           <a:p>
             <a:fld id="{DEB49C4A-65AC-492D-9701-81B46C3AD0E4}" type="datetimeFigureOut">
               <a:rPr lang="en-US" smtClean="0"/>
-              <a:t>1/30/2026</a:t>
+              <a:t>1/31/2026</a:t>
             </a:fld>
             <a:endParaRPr lang="en-US"/>
           </a:p>
@@ -2891,7 +2893,7 @@
           <a:p>
             <a:fld id="{384A29A4-78C8-47AB-BA06-22CB45938951}" type="datetime1">
               <a:rPr lang="en-US" smtClean="0"/>
-              <a:t>1/30/2026</a:t>
+              <a:t>1/31/2026</a:t>
             </a:fld>
             <a:endParaRPr lang="en-US"/>
           </a:p>
@@ -3086,7 +3088,7 @@
           <a:p>
             <a:fld id="{E1ED4ACF-2D82-46F2-A8E9-23963AA34E86}" type="datetime1">
               <a:rPr lang="en-US" smtClean="0"/>
-              <a:t>1/30/2026</a:t>
+              <a:t>1/31/2026</a:t>
             </a:fld>
             <a:endParaRPr lang="en-US"/>
           </a:p>
@@ -3270,7 +3272,7 @@
           <a:p>
             <a:fld id="{AE374B5B-21A0-4192-BF4C-38187F1A68D8}" type="datetime1">
               <a:rPr lang="en-US" smtClean="0"/>
-              <a:t>1/30/2026</a:t>
+              <a:t>1/31/2026</a:t>
             </a:fld>
             <a:endParaRPr lang="en-US"/>
           </a:p>
@@ -5611,7 +5613,7 @@
           <a:p>
             <a:fld id="{33B5CF7C-B333-48E1-A4A6-83A3C8B73AC0}" type="datetime1">
               <a:rPr lang="en-US" smtClean="0"/>
-              <a:t>1/30/2026</a:t>
+              <a:t>1/31/2026</a:t>
             </a:fld>
             <a:endParaRPr lang="en-US"/>
           </a:p>
@@ -6064,7 +6066,7 @@
           <a:p>
             <a:fld id="{AE320762-5CBF-4210-AB54-376B091119F8}" type="datetime1">
               <a:rPr lang="en-US" smtClean="0"/>
-              <a:t>1/30/2026</a:t>
+              <a:t>1/31/2026</a:t>
             </a:fld>
             <a:endParaRPr lang="en-US"/>
           </a:p>
@@ -6196,7 +6198,7 @@
           <a:p>
             <a:fld id="{7F0DB371-BF5F-4058-A212-1A908E4D2674}" type="datetime1">
               <a:rPr lang="en-US" smtClean="0"/>
-              <a:t>1/30/2026</a:t>
+              <a:t>1/31/2026</a:t>
             </a:fld>
             <a:endParaRPr lang="en-US"/>
           </a:p>
@@ -8129,7 +8131,7 @@
           <a:p>
             <a:fld id="{60A4083B-90AA-48CF-BAD5-00AA24D7F288}" type="datetime1">
               <a:rPr lang="en-US" smtClean="0"/>
-              <a:t>1/30/2026</a:t>
+              <a:t>1/31/2026</a:t>
             </a:fld>
             <a:endParaRPr lang="en-US"/>
           </a:p>
@@ -10388,7 +10390,7 @@
             <a:fld id="{F5BAF629-ECA2-4CF3-B790-9D9BDED98269}" type="datetime1">
               <a:rPr lang="en-US" smtClean="0"/>
               <a:pPr/>
-              <a:t>1/30/2026</a:t>
+              <a:t>1/31/2026</a:t>
             </a:fld>
             <a:endParaRPr lang="en-US"/>
           </a:p>
@@ -14683,7 +14685,7 @@
             <a:fld id="{B51B2453-8663-4C69-AF73-9FD7B1DEC5D0}" type="datetime1">
               <a:rPr lang="en-US" smtClean="0"/>
               <a:pPr/>
-              <a:t>1/30/2026</a:t>
+              <a:t>1/31/2026</a:t>
             </a:fld>
             <a:endParaRPr lang="en-US" dirty="0"/>
           </a:p>
@@ -18160,7 +18162,7 @@
           <p:cNvPr id="2" name="Title 1">
             <a:extLst>
               <a:ext uri="{FF2B5EF4-FFF2-40B4-BE49-F238E27FC236}">
-                <a16:creationId xmlns:a16="http://schemas.microsoft.com/office/drawing/2014/main" id="{83D1E796-97AF-FE5F-34A7-B1C74FD64868}"/>
+                <a16:creationId xmlns:a16="http://schemas.microsoft.com/office/drawing/2014/main" id="{E5C0EB30-5EEF-F4B4-5AB0-7A51CE3B42C6}"/>
               </a:ext>
             </a:extLst>
           </p:cNvPr>
@@ -18171,8 +18173,8 @@
         </p:nvSpPr>
         <p:spPr>
           <a:xfrm>
-            <a:off x="589935" y="385867"/>
-            <a:ext cx="9601200" cy="931656"/>
+            <a:off x="514877" y="289039"/>
+            <a:ext cx="11326762" cy="931656"/>
           </a:xfrm>
           <a:prstGeom prst="rect">
             <a:avLst/>
@@ -18202,20 +18204,122 @@
             </a:lvl1pPr>
           </a:lstStyle>
           <a:p>
+            <a:pPr>
+              <a:lnSpc>
+                <a:spcPct val="150000"/>
+              </a:lnSpc>
+            </a:pPr>
             <a:r>
-              <a:rPr lang="en-US" dirty="0"/>
-              <a:t>Effect of the Extension </a:t>
+              <a:rPr lang="en-US" sz="2900" dirty="0"/>
+              <a:t>Average Time in System (W) – Effect of Overflow Policies</a:t>
             </a:r>
+          </a:p>
+          <a:p>
+            <a:pPr>
+              <a:lnSpc>
+                <a:spcPct val="150000"/>
+              </a:lnSpc>
+            </a:pPr>
             <a:endParaRPr lang="fa-IR" dirty="0"/>
           </a:p>
         </p:txBody>
       </p:sp>
+      <p:pic>
+        <p:nvPicPr>
+          <p:cNvPr id="4" name="Picture 3">
+            <a:extLst>
+              <a:ext uri="{FF2B5EF4-FFF2-40B4-BE49-F238E27FC236}">
+                <a16:creationId xmlns:a16="http://schemas.microsoft.com/office/drawing/2014/main" id="{3DB4C416-EABB-A3CC-C867-F787793CE6CD}"/>
+              </a:ext>
+            </a:extLst>
+          </p:cNvPr>
+          <p:cNvPicPr>
+            <a:picLocks noChangeAspect="1"/>
+          </p:cNvPicPr>
+          <p:nvPr/>
+        </p:nvPicPr>
+        <p:blipFill>
+          <a:blip r:embed="rId2"/>
+          <a:stretch>
+            <a:fillRect/>
+          </a:stretch>
+        </p:blipFill>
+        <p:spPr>
+          <a:xfrm>
+            <a:off x="4283091" y="1796965"/>
+            <a:ext cx="3565511" cy="2674133"/>
+          </a:xfrm>
+          <a:prstGeom prst="rect">
+            <a:avLst/>
+          </a:prstGeom>
+        </p:spPr>
+      </p:pic>
+      <p:pic>
+        <p:nvPicPr>
+          <p:cNvPr id="6" name="Picture 5">
+            <a:extLst>
+              <a:ext uri="{FF2B5EF4-FFF2-40B4-BE49-F238E27FC236}">
+                <a16:creationId xmlns:a16="http://schemas.microsoft.com/office/drawing/2014/main" id="{FBB09272-5BD7-05A8-305D-700ECB8623C9}"/>
+              </a:ext>
+            </a:extLst>
+          </p:cNvPr>
+          <p:cNvPicPr>
+            <a:picLocks noChangeAspect="1"/>
+          </p:cNvPicPr>
+          <p:nvPr/>
+        </p:nvPicPr>
+        <p:blipFill>
+          <a:blip r:embed="rId3"/>
+          <a:stretch>
+            <a:fillRect/>
+          </a:stretch>
+        </p:blipFill>
+        <p:spPr>
+          <a:xfrm>
+            <a:off x="454570" y="1796965"/>
+            <a:ext cx="3565511" cy="2674133"/>
+          </a:xfrm>
+          <a:prstGeom prst="rect">
+            <a:avLst/>
+          </a:prstGeom>
+        </p:spPr>
+      </p:pic>
+      <p:pic>
+        <p:nvPicPr>
+          <p:cNvPr id="8" name="Picture 7">
+            <a:extLst>
+              <a:ext uri="{FF2B5EF4-FFF2-40B4-BE49-F238E27FC236}">
+                <a16:creationId xmlns:a16="http://schemas.microsoft.com/office/drawing/2014/main" id="{D6EE66AD-FE14-A293-80C7-991BE7E07BB7}"/>
+              </a:ext>
+            </a:extLst>
+          </p:cNvPr>
+          <p:cNvPicPr>
+            <a:picLocks noChangeAspect="1"/>
+          </p:cNvPicPr>
+          <p:nvPr/>
+        </p:nvPicPr>
+        <p:blipFill>
+          <a:blip r:embed="rId4"/>
+          <a:stretch>
+            <a:fillRect/>
+          </a:stretch>
+        </p:blipFill>
+        <p:spPr>
+          <a:xfrm>
+            <a:off x="8111612" y="1796965"/>
+            <a:ext cx="3565511" cy="2674133"/>
+          </a:xfrm>
+          <a:prstGeom prst="rect">
+            <a:avLst/>
+          </a:prstGeom>
+        </p:spPr>
+      </p:pic>
       <p:sp>
         <p:nvSpPr>
-          <p:cNvPr id="3" name="Content Placeholder 2">
+          <p:cNvPr id="9" name="Content Placeholder 2">
             <a:extLst>
               <a:ext uri="{FF2B5EF4-FFF2-40B4-BE49-F238E27FC236}">
-                <a16:creationId xmlns:a16="http://schemas.microsoft.com/office/drawing/2014/main" id="{B1B8C4E8-45F5-AFB0-5F5E-9055B8F5927A}"/>
+                <a16:creationId xmlns:a16="http://schemas.microsoft.com/office/drawing/2014/main" id="{8902302F-E3B5-A30F-F763-C2F6E5ACA1CA}"/>
               </a:ext>
             </a:extLst>
           </p:cNvPr>
@@ -18226,8 +18330,8 @@
         </p:nvSpPr>
         <p:spPr>
           <a:xfrm>
-            <a:off x="589935" y="1221658"/>
-            <a:ext cx="6833419" cy="4414683"/>
+            <a:off x="222368" y="4598917"/>
+            <a:ext cx="4060723" cy="823402"/>
           </a:xfrm>
           <a:prstGeom prst="rect">
             <a:avLst/>
@@ -18456,85 +18560,825 @@
             </a:lvl9pPr>
           </a:lstStyle>
           <a:p>
-            <a:pPr algn="just">
-              <a:lnSpc>
-                <a:spcPct val="150000"/>
-              </a:lnSpc>
-              <a:buFont typeface="Arial" panose="020B0604020202020204" pitchFamily="34" charset="0"/>
-              <a:buChar char="•"/>
+            <a:pPr marL="0" indent="0" algn="ctr">
+              <a:lnSpc>
+                <a:spcPct val="100000"/>
+              </a:lnSpc>
+              <a:buNone/>
             </a:pPr>
             <a:r>
               <a:rPr lang="en-US" sz="1400" dirty="0"/>
-              <a:t>Introducing a finite queue capacity makes queues fill up faster, deviating from the idealized theoretical model but reflecting real systems.</a:t>
+              <a:t>Infinite Queue (No Overflow Policy)</a:t>
             </a:r>
           </a:p>
+        </p:txBody>
+      </p:sp>
+      <p:sp>
+        <p:nvSpPr>
+          <p:cNvPr id="11" name="Content Placeholder 2">
+            <a:extLst>
+              <a:ext uri="{FF2B5EF4-FFF2-40B4-BE49-F238E27FC236}">
+                <a16:creationId xmlns:a16="http://schemas.microsoft.com/office/drawing/2014/main" id="{D167CAE7-DA9F-5F64-B644-CE7C4DC92117}"/>
+              </a:ext>
+            </a:extLst>
+          </p:cNvPr>
+          <p:cNvSpPr txBox="1">
+            <a:spLocks/>
+          </p:cNvSpPr>
+          <p:nvPr/>
+        </p:nvSpPr>
+        <p:spPr>
+          <a:xfrm>
+            <a:off x="4147895" y="4598917"/>
+            <a:ext cx="4060723" cy="823402"/>
+          </a:xfrm>
+          <a:prstGeom prst="rect">
+            <a:avLst/>
+          </a:prstGeom>
+        </p:spPr>
+        <p:txBody>
+          <a:bodyPr>
+            <a:noAutofit/>
+          </a:bodyPr>
+          <a:lstStyle>
+            <a:lvl1pPr marL="228600" indent="-228600" algn="l" defTabSz="914400" rtl="0" eaLnBrk="1" latinLnBrk="0" hangingPunct="1">
+              <a:lnSpc>
+                <a:spcPct val="90000"/>
+              </a:lnSpc>
+              <a:spcBef>
+                <a:spcPts val="1800"/>
+              </a:spcBef>
+              <a:buClr>
+                <a:schemeClr val="accent1">
+                  <a:lumMod val="75000"/>
+                </a:schemeClr>
+              </a:buClr>
+              <a:buSzPct val="100000"/>
+              <a:buFont typeface="Arial" pitchFamily="34" charset="0"/>
+              <a:buChar char="▪"/>
+              <a:defRPr sz="2000" kern="1200">
+                <a:solidFill>
+                  <a:schemeClr val="tx1"/>
+                </a:solidFill>
+                <a:latin typeface="+mn-lt"/>
+                <a:ea typeface="+mn-ea"/>
+                <a:cs typeface="+mn-cs"/>
+              </a:defRPr>
+            </a:lvl1pPr>
+            <a:lvl2pPr marL="457200" indent="-182880" algn="l" defTabSz="914400" rtl="0" eaLnBrk="1" latinLnBrk="0" hangingPunct="1">
+              <a:lnSpc>
+                <a:spcPct val="90000"/>
+              </a:lnSpc>
+              <a:spcBef>
+                <a:spcPts val="1200"/>
+              </a:spcBef>
+              <a:buClr>
+                <a:schemeClr val="accent1">
+                  <a:lumMod val="75000"/>
+                </a:schemeClr>
+              </a:buClr>
+              <a:buSzPct val="100000"/>
+              <a:buFont typeface="Arial" pitchFamily="34" charset="0"/>
+              <a:buChar char="▪"/>
+              <a:defRPr sz="1800" kern="1200">
+                <a:solidFill>
+                  <a:schemeClr val="tx1"/>
+                </a:solidFill>
+                <a:latin typeface="+mn-lt"/>
+                <a:ea typeface="+mn-ea"/>
+                <a:cs typeface="+mn-cs"/>
+              </a:defRPr>
+            </a:lvl2pPr>
+            <a:lvl3pPr marL="685800" indent="-179388" algn="l" defTabSz="914400" rtl="0" eaLnBrk="1" latinLnBrk="0" hangingPunct="1">
+              <a:lnSpc>
+                <a:spcPct val="90000"/>
+              </a:lnSpc>
+              <a:spcBef>
+                <a:spcPts val="800"/>
+              </a:spcBef>
+              <a:buClr>
+                <a:schemeClr val="accent1">
+                  <a:lumMod val="75000"/>
+                </a:schemeClr>
+              </a:buClr>
+              <a:buSzPct val="100000"/>
+              <a:buFont typeface="Arial" pitchFamily="34" charset="0"/>
+              <a:buChar char="▪"/>
+              <a:defRPr sz="1600" kern="1200">
+                <a:solidFill>
+                  <a:schemeClr val="tx1"/>
+                </a:solidFill>
+                <a:latin typeface="+mn-lt"/>
+                <a:ea typeface="+mn-ea"/>
+                <a:cs typeface="+mn-cs"/>
+              </a:defRPr>
+            </a:lvl3pPr>
+            <a:lvl4pPr marL="914400" indent="-182880" algn="l" defTabSz="914400" rtl="0" eaLnBrk="1" latinLnBrk="0" hangingPunct="1">
+              <a:lnSpc>
+                <a:spcPct val="90000"/>
+              </a:lnSpc>
+              <a:spcBef>
+                <a:spcPts val="800"/>
+              </a:spcBef>
+              <a:buClr>
+                <a:schemeClr val="accent1">
+                  <a:lumMod val="75000"/>
+                </a:schemeClr>
+              </a:buClr>
+              <a:buSzPct val="100000"/>
+              <a:buFont typeface="Arial" pitchFamily="34" charset="0"/>
+              <a:buChar char="▪"/>
+              <a:defRPr sz="1400" kern="1200">
+                <a:solidFill>
+                  <a:schemeClr val="tx1"/>
+                </a:solidFill>
+                <a:latin typeface="+mn-lt"/>
+                <a:ea typeface="+mn-ea"/>
+                <a:cs typeface="+mn-cs"/>
+              </a:defRPr>
+            </a:lvl4pPr>
+            <a:lvl5pPr marL="1143000" indent="-179388" algn="l" defTabSz="914400" rtl="0" eaLnBrk="1" latinLnBrk="0" hangingPunct="1">
+              <a:lnSpc>
+                <a:spcPct val="90000"/>
+              </a:lnSpc>
+              <a:spcBef>
+                <a:spcPts val="600"/>
+              </a:spcBef>
+              <a:buClr>
+                <a:schemeClr val="accent1">
+                  <a:lumMod val="75000"/>
+                </a:schemeClr>
+              </a:buClr>
+              <a:buSzPct val="100000"/>
+              <a:buFont typeface="Arial" pitchFamily="34" charset="0"/>
+              <a:buChar char="▪"/>
+              <a:defRPr sz="1400" kern="1200">
+                <a:solidFill>
+                  <a:schemeClr val="tx1"/>
+                </a:solidFill>
+                <a:latin typeface="+mn-lt"/>
+                <a:ea typeface="+mn-ea"/>
+                <a:cs typeface="+mn-cs"/>
+              </a:defRPr>
+            </a:lvl5pPr>
+            <a:lvl6pPr marL="1371600" indent="-182880" algn="l" defTabSz="914400" rtl="0" eaLnBrk="1" latinLnBrk="0" hangingPunct="1">
+              <a:lnSpc>
+                <a:spcPct val="90000"/>
+              </a:lnSpc>
+              <a:spcBef>
+                <a:spcPts val="600"/>
+              </a:spcBef>
+              <a:buClr>
+                <a:schemeClr val="accent1">
+                  <a:lumMod val="75000"/>
+                </a:schemeClr>
+              </a:buClr>
+              <a:buSzPct val="100000"/>
+              <a:buFont typeface="Arial" pitchFamily="34" charset="0"/>
+              <a:buChar char="▪"/>
+              <a:defRPr sz="1400" kern="1200">
+                <a:solidFill>
+                  <a:schemeClr val="tx1"/>
+                </a:solidFill>
+                <a:latin typeface="+mn-lt"/>
+                <a:ea typeface="+mn-ea"/>
+                <a:cs typeface="+mn-cs"/>
+              </a:defRPr>
+            </a:lvl6pPr>
+            <a:lvl7pPr marL="1600200" indent="-179388" algn="l" defTabSz="914400" rtl="0" eaLnBrk="1" latinLnBrk="0" hangingPunct="1">
+              <a:lnSpc>
+                <a:spcPct val="90000"/>
+              </a:lnSpc>
+              <a:spcBef>
+                <a:spcPts val="600"/>
+              </a:spcBef>
+              <a:buClr>
+                <a:schemeClr val="accent1">
+                  <a:lumMod val="75000"/>
+                </a:schemeClr>
+              </a:buClr>
+              <a:buSzPct val="100000"/>
+              <a:buFont typeface="Arial" pitchFamily="34" charset="0"/>
+              <a:buChar char="▪"/>
+              <a:defRPr sz="1400" kern="1200">
+                <a:solidFill>
+                  <a:schemeClr val="tx1"/>
+                </a:solidFill>
+                <a:latin typeface="+mn-lt"/>
+                <a:ea typeface="+mn-ea"/>
+                <a:cs typeface="+mn-cs"/>
+              </a:defRPr>
+            </a:lvl7pPr>
+            <a:lvl8pPr marL="1828800" indent="-182880" algn="l" defTabSz="914400" rtl="0" eaLnBrk="1" latinLnBrk="0" hangingPunct="1">
+              <a:lnSpc>
+                <a:spcPct val="90000"/>
+              </a:lnSpc>
+              <a:spcBef>
+                <a:spcPts val="600"/>
+              </a:spcBef>
+              <a:buClr>
+                <a:schemeClr val="accent1">
+                  <a:lumMod val="75000"/>
+                </a:schemeClr>
+              </a:buClr>
+              <a:buSzPct val="100000"/>
+              <a:buFont typeface="Arial" pitchFamily="34" charset="0"/>
+              <a:buChar char="▪"/>
+              <a:defRPr sz="1400" kern="1200">
+                <a:solidFill>
+                  <a:schemeClr val="tx1"/>
+                </a:solidFill>
+                <a:latin typeface="+mn-lt"/>
+                <a:ea typeface="+mn-ea"/>
+                <a:cs typeface="+mn-cs"/>
+              </a:defRPr>
+            </a:lvl8pPr>
+            <a:lvl9pPr marL="1878012" indent="0" algn="l" defTabSz="914400" rtl="0" eaLnBrk="1" latinLnBrk="0" hangingPunct="1">
+              <a:lnSpc>
+                <a:spcPct val="90000"/>
+              </a:lnSpc>
+              <a:spcBef>
+                <a:spcPts val="600"/>
+              </a:spcBef>
+              <a:buClr>
+                <a:schemeClr val="accent1">
+                  <a:lumMod val="75000"/>
+                </a:schemeClr>
+              </a:buClr>
+              <a:buSzPct val="100000"/>
+              <a:buFont typeface="Arial" pitchFamily="34" charset="0"/>
+              <a:buNone/>
+              <a:defRPr sz="1400" kern="1200">
+                <a:solidFill>
+                  <a:schemeClr val="tx1"/>
+                </a:solidFill>
+                <a:latin typeface="+mn-lt"/>
+                <a:ea typeface="+mn-ea"/>
+                <a:cs typeface="+mn-cs"/>
+              </a:defRPr>
+            </a:lvl9pPr>
+          </a:lstStyle>
           <a:p>
-            <a:pPr algn="just">
-              <a:lnSpc>
-                <a:spcPct val="150000"/>
-              </a:lnSpc>
-              <a:buFont typeface="Arial" panose="020B0604020202020204" pitchFamily="34" charset="0"/>
-              <a:buChar char="•"/>
-            </a:pPr>
-            <a:endParaRPr lang="en-US" sz="1400" dirty="0"/>
-          </a:p>
-          <a:p>
-            <a:pPr algn="just">
-              <a:lnSpc>
-                <a:spcPct val="150000"/>
-              </a:lnSpc>
-              <a:buFont typeface="Arial" panose="020B0604020202020204" pitchFamily="34" charset="0"/>
-              <a:buChar char="•"/>
+            <a:pPr marL="0" indent="0" algn="ctr">
+              <a:lnSpc>
+                <a:spcPct val="100000"/>
+              </a:lnSpc>
+              <a:buNone/>
             </a:pPr>
             <a:r>
               <a:rPr lang="en-US" sz="1400" dirty="0"/>
-              <a:t>Even with limited queue capacity, the supermarket method has a strong impact: queue lengths are significantly reduced already for d = 2.</a:t>
+              <a:t>Finite Queue with Drop Policy</a:t>
             </a:r>
           </a:p>
+        </p:txBody>
+      </p:sp>
+      <p:sp>
+        <p:nvSpPr>
+          <p:cNvPr id="14" name="Content Placeholder 2">
+            <a:extLst>
+              <a:ext uri="{FF2B5EF4-FFF2-40B4-BE49-F238E27FC236}">
+                <a16:creationId xmlns:a16="http://schemas.microsoft.com/office/drawing/2014/main" id="{85552E7D-8EE7-D59B-324D-B80CA3D0ABE6}"/>
+              </a:ext>
+            </a:extLst>
+          </p:cNvPr>
+          <p:cNvSpPr txBox="1">
+            <a:spLocks/>
+          </p:cNvSpPr>
+          <p:nvPr/>
+        </p:nvSpPr>
+        <p:spPr>
+          <a:xfrm>
+            <a:off x="7577641" y="4598917"/>
+            <a:ext cx="4633452" cy="823402"/>
+          </a:xfrm>
+          <a:prstGeom prst="rect">
+            <a:avLst/>
+          </a:prstGeom>
+        </p:spPr>
+        <p:txBody>
+          <a:bodyPr>
+            <a:noAutofit/>
+          </a:bodyPr>
+          <a:lstStyle>
+            <a:lvl1pPr marL="228600" indent="-228600" algn="l" defTabSz="914400" rtl="0" eaLnBrk="1" latinLnBrk="0" hangingPunct="1">
+              <a:lnSpc>
+                <a:spcPct val="90000"/>
+              </a:lnSpc>
+              <a:spcBef>
+                <a:spcPts val="1800"/>
+              </a:spcBef>
+              <a:buClr>
+                <a:schemeClr val="accent1">
+                  <a:lumMod val="75000"/>
+                </a:schemeClr>
+              </a:buClr>
+              <a:buSzPct val="100000"/>
+              <a:buFont typeface="Arial" pitchFamily="34" charset="0"/>
+              <a:buChar char="▪"/>
+              <a:defRPr sz="2000" kern="1200">
+                <a:solidFill>
+                  <a:schemeClr val="tx1"/>
+                </a:solidFill>
+                <a:latin typeface="+mn-lt"/>
+                <a:ea typeface="+mn-ea"/>
+                <a:cs typeface="+mn-cs"/>
+              </a:defRPr>
+            </a:lvl1pPr>
+            <a:lvl2pPr marL="457200" indent="-182880" algn="l" defTabSz="914400" rtl="0" eaLnBrk="1" latinLnBrk="0" hangingPunct="1">
+              <a:lnSpc>
+                <a:spcPct val="90000"/>
+              </a:lnSpc>
+              <a:spcBef>
+                <a:spcPts val="1200"/>
+              </a:spcBef>
+              <a:buClr>
+                <a:schemeClr val="accent1">
+                  <a:lumMod val="75000"/>
+                </a:schemeClr>
+              </a:buClr>
+              <a:buSzPct val="100000"/>
+              <a:buFont typeface="Arial" pitchFamily="34" charset="0"/>
+              <a:buChar char="▪"/>
+              <a:defRPr sz="1800" kern="1200">
+                <a:solidFill>
+                  <a:schemeClr val="tx1"/>
+                </a:solidFill>
+                <a:latin typeface="+mn-lt"/>
+                <a:ea typeface="+mn-ea"/>
+                <a:cs typeface="+mn-cs"/>
+              </a:defRPr>
+            </a:lvl2pPr>
+            <a:lvl3pPr marL="685800" indent="-179388" algn="l" defTabSz="914400" rtl="0" eaLnBrk="1" latinLnBrk="0" hangingPunct="1">
+              <a:lnSpc>
+                <a:spcPct val="90000"/>
+              </a:lnSpc>
+              <a:spcBef>
+                <a:spcPts val="800"/>
+              </a:spcBef>
+              <a:buClr>
+                <a:schemeClr val="accent1">
+                  <a:lumMod val="75000"/>
+                </a:schemeClr>
+              </a:buClr>
+              <a:buSzPct val="100000"/>
+              <a:buFont typeface="Arial" pitchFamily="34" charset="0"/>
+              <a:buChar char="▪"/>
+              <a:defRPr sz="1600" kern="1200">
+                <a:solidFill>
+                  <a:schemeClr val="tx1"/>
+                </a:solidFill>
+                <a:latin typeface="+mn-lt"/>
+                <a:ea typeface="+mn-ea"/>
+                <a:cs typeface="+mn-cs"/>
+              </a:defRPr>
+            </a:lvl3pPr>
+            <a:lvl4pPr marL="914400" indent="-182880" algn="l" defTabSz="914400" rtl="0" eaLnBrk="1" latinLnBrk="0" hangingPunct="1">
+              <a:lnSpc>
+                <a:spcPct val="90000"/>
+              </a:lnSpc>
+              <a:spcBef>
+                <a:spcPts val="800"/>
+              </a:spcBef>
+              <a:buClr>
+                <a:schemeClr val="accent1">
+                  <a:lumMod val="75000"/>
+                </a:schemeClr>
+              </a:buClr>
+              <a:buSzPct val="100000"/>
+              <a:buFont typeface="Arial" pitchFamily="34" charset="0"/>
+              <a:buChar char="▪"/>
+              <a:defRPr sz="1400" kern="1200">
+                <a:solidFill>
+                  <a:schemeClr val="tx1"/>
+                </a:solidFill>
+                <a:latin typeface="+mn-lt"/>
+                <a:ea typeface="+mn-ea"/>
+                <a:cs typeface="+mn-cs"/>
+              </a:defRPr>
+            </a:lvl4pPr>
+            <a:lvl5pPr marL="1143000" indent="-179388" algn="l" defTabSz="914400" rtl="0" eaLnBrk="1" latinLnBrk="0" hangingPunct="1">
+              <a:lnSpc>
+                <a:spcPct val="90000"/>
+              </a:lnSpc>
+              <a:spcBef>
+                <a:spcPts val="600"/>
+              </a:spcBef>
+              <a:buClr>
+                <a:schemeClr val="accent1">
+                  <a:lumMod val="75000"/>
+                </a:schemeClr>
+              </a:buClr>
+              <a:buSzPct val="100000"/>
+              <a:buFont typeface="Arial" pitchFamily="34" charset="0"/>
+              <a:buChar char="▪"/>
+              <a:defRPr sz="1400" kern="1200">
+                <a:solidFill>
+                  <a:schemeClr val="tx1"/>
+                </a:solidFill>
+                <a:latin typeface="+mn-lt"/>
+                <a:ea typeface="+mn-ea"/>
+                <a:cs typeface="+mn-cs"/>
+              </a:defRPr>
+            </a:lvl5pPr>
+            <a:lvl6pPr marL="1371600" indent="-182880" algn="l" defTabSz="914400" rtl="0" eaLnBrk="1" latinLnBrk="0" hangingPunct="1">
+              <a:lnSpc>
+                <a:spcPct val="90000"/>
+              </a:lnSpc>
+              <a:spcBef>
+                <a:spcPts val="600"/>
+              </a:spcBef>
+              <a:buClr>
+                <a:schemeClr val="accent1">
+                  <a:lumMod val="75000"/>
+                </a:schemeClr>
+              </a:buClr>
+              <a:buSzPct val="100000"/>
+              <a:buFont typeface="Arial" pitchFamily="34" charset="0"/>
+              <a:buChar char="▪"/>
+              <a:defRPr sz="1400" kern="1200">
+                <a:solidFill>
+                  <a:schemeClr val="tx1"/>
+                </a:solidFill>
+                <a:latin typeface="+mn-lt"/>
+                <a:ea typeface="+mn-ea"/>
+                <a:cs typeface="+mn-cs"/>
+              </a:defRPr>
+            </a:lvl6pPr>
+            <a:lvl7pPr marL="1600200" indent="-179388" algn="l" defTabSz="914400" rtl="0" eaLnBrk="1" latinLnBrk="0" hangingPunct="1">
+              <a:lnSpc>
+                <a:spcPct val="90000"/>
+              </a:lnSpc>
+              <a:spcBef>
+                <a:spcPts val="600"/>
+              </a:spcBef>
+              <a:buClr>
+                <a:schemeClr val="accent1">
+                  <a:lumMod val="75000"/>
+                </a:schemeClr>
+              </a:buClr>
+              <a:buSzPct val="100000"/>
+              <a:buFont typeface="Arial" pitchFamily="34" charset="0"/>
+              <a:buChar char="▪"/>
+              <a:defRPr sz="1400" kern="1200">
+                <a:solidFill>
+                  <a:schemeClr val="tx1"/>
+                </a:solidFill>
+                <a:latin typeface="+mn-lt"/>
+                <a:ea typeface="+mn-ea"/>
+                <a:cs typeface="+mn-cs"/>
+              </a:defRPr>
+            </a:lvl7pPr>
+            <a:lvl8pPr marL="1828800" indent="-182880" algn="l" defTabSz="914400" rtl="0" eaLnBrk="1" latinLnBrk="0" hangingPunct="1">
+              <a:lnSpc>
+                <a:spcPct val="90000"/>
+              </a:lnSpc>
+              <a:spcBef>
+                <a:spcPts val="600"/>
+              </a:spcBef>
+              <a:buClr>
+                <a:schemeClr val="accent1">
+                  <a:lumMod val="75000"/>
+                </a:schemeClr>
+              </a:buClr>
+              <a:buSzPct val="100000"/>
+              <a:buFont typeface="Arial" pitchFamily="34" charset="0"/>
+              <a:buChar char="▪"/>
+              <a:defRPr sz="1400" kern="1200">
+                <a:solidFill>
+                  <a:schemeClr val="tx1"/>
+                </a:solidFill>
+                <a:latin typeface="+mn-lt"/>
+                <a:ea typeface="+mn-ea"/>
+                <a:cs typeface="+mn-cs"/>
+              </a:defRPr>
+            </a:lvl8pPr>
+            <a:lvl9pPr marL="1878012" indent="0" algn="l" defTabSz="914400" rtl="0" eaLnBrk="1" latinLnBrk="0" hangingPunct="1">
+              <a:lnSpc>
+                <a:spcPct val="90000"/>
+              </a:lnSpc>
+              <a:spcBef>
+                <a:spcPts val="600"/>
+              </a:spcBef>
+              <a:buClr>
+                <a:schemeClr val="accent1">
+                  <a:lumMod val="75000"/>
+                </a:schemeClr>
+              </a:buClr>
+              <a:buSzPct val="100000"/>
+              <a:buFont typeface="Arial" pitchFamily="34" charset="0"/>
+              <a:buNone/>
+              <a:defRPr sz="1400" kern="1200">
+                <a:solidFill>
+                  <a:schemeClr val="tx1"/>
+                </a:solidFill>
+                <a:latin typeface="+mn-lt"/>
+                <a:ea typeface="+mn-ea"/>
+                <a:cs typeface="+mn-cs"/>
+              </a:defRPr>
+            </a:lvl9pPr>
+          </a:lstStyle>
           <a:p>
-            <a:pPr algn="just">
-              <a:lnSpc>
-                <a:spcPct val="150000"/>
-              </a:lnSpc>
-              <a:buFont typeface="Arial" panose="020B0604020202020204" pitchFamily="34" charset="0"/>
-              <a:buChar char="•"/>
-            </a:pPr>
-            <a:endParaRPr lang="en-US" sz="1400" dirty="0"/>
-          </a:p>
-          <a:p>
-            <a:pPr algn="just">
-              <a:lnSpc>
-                <a:spcPct val="150000"/>
-              </a:lnSpc>
-              <a:buFont typeface="Arial" panose="020B0604020202020204" pitchFamily="34" charset="0"/>
-              <a:buChar char="•"/>
+            <a:pPr marL="0" indent="0" algn="ctr">
+              <a:lnSpc>
+                <a:spcPct val="100000"/>
+              </a:lnSpc>
+              <a:spcBef>
+                <a:spcPts val="0"/>
+              </a:spcBef>
+              <a:spcAft>
+                <a:spcPts val="600"/>
+              </a:spcAft>
+              <a:buNone/>
             </a:pPr>
             <a:r>
               <a:rPr lang="en-US" sz="1400" dirty="0"/>
-              <a:t>Adding a retry mechanism increases the load on the system, but drastically reduces the job drop rate.</a:t>
+              <a:t>Finite Queue with Retry Policy </a:t>
             </a:r>
+            <a:endParaRPr lang="fa-IR" sz="1400" dirty="0"/>
           </a:p>
           <a:p>
-            <a:pPr algn="just">
-              <a:lnSpc>
-                <a:spcPct val="150000"/>
-              </a:lnSpc>
-              <a:buFont typeface="Arial" panose="020B0604020202020204" pitchFamily="34" charset="0"/>
-              <a:buChar char="•"/>
-            </a:pPr>
-            <a:endParaRPr lang="en-US" sz="1400" dirty="0"/>
-          </a:p>
-          <a:p>
-            <a:pPr algn="just">
-              <a:lnSpc>
-                <a:spcPct val="150000"/>
-              </a:lnSpc>
-              <a:buFont typeface="Arial" panose="020B0604020202020204" pitchFamily="34" charset="0"/>
-              <a:buChar char="•"/>
+            <a:pPr marL="0" indent="0" algn="ctr">
+              <a:lnSpc>
+                <a:spcPct val="100000"/>
+              </a:lnSpc>
+              <a:spcBef>
+                <a:spcPts val="0"/>
+              </a:spcBef>
+              <a:spcAft>
+                <a:spcPts val="600"/>
+              </a:spcAft>
+              <a:buNone/>
             </a:pPr>
             <a:r>
               <a:rPr lang="en-US" sz="1400" dirty="0"/>
-              <a:t>Overall, combining finite queue capacity and retry with the supermarket model results in a realistic system with very good performance under high load.</a:t>
+              <a:t>(Max</a:t>
+            </a:r>
+            <a:r>
+              <a:rPr lang="fa-IR" sz="1400" dirty="0"/>
+              <a:t> </a:t>
+            </a:r>
+            <a:r>
+              <a:rPr lang="en-US" sz="1400" dirty="0"/>
+              <a:t>Retries = 3)</a:t>
+            </a:r>
+          </a:p>
+        </p:txBody>
+      </p:sp>
+      <p:sp>
+        <p:nvSpPr>
+          <p:cNvPr id="15" name="Content Placeholder 2">
+            <a:extLst>
+              <a:ext uri="{FF2B5EF4-FFF2-40B4-BE49-F238E27FC236}">
+                <a16:creationId xmlns:a16="http://schemas.microsoft.com/office/drawing/2014/main" id="{400CC3FC-BB47-143C-DF2C-BF5D3507B9CC}"/>
+              </a:ext>
+            </a:extLst>
+          </p:cNvPr>
+          <p:cNvSpPr txBox="1">
+            <a:spLocks/>
+          </p:cNvSpPr>
+          <p:nvPr/>
+        </p:nvSpPr>
+        <p:spPr>
+          <a:xfrm>
+            <a:off x="2178986" y="6187585"/>
+            <a:ext cx="7998542" cy="450202"/>
+          </a:xfrm>
+          <a:prstGeom prst="rect">
+            <a:avLst/>
+          </a:prstGeom>
+        </p:spPr>
+        <p:txBody>
+          <a:bodyPr>
+            <a:noAutofit/>
+          </a:bodyPr>
+          <a:lstStyle>
+            <a:lvl1pPr marL="228600" indent="-228600" algn="l" defTabSz="914400" rtl="0" eaLnBrk="1" latinLnBrk="0" hangingPunct="1">
+              <a:lnSpc>
+                <a:spcPct val="90000"/>
+              </a:lnSpc>
+              <a:spcBef>
+                <a:spcPts val="1800"/>
+              </a:spcBef>
+              <a:buClr>
+                <a:schemeClr val="accent1">
+                  <a:lumMod val="75000"/>
+                </a:schemeClr>
+              </a:buClr>
+              <a:buSzPct val="100000"/>
+              <a:buFont typeface="Arial" pitchFamily="34" charset="0"/>
+              <a:buChar char="▪"/>
+              <a:defRPr sz="2000" kern="1200">
+                <a:solidFill>
+                  <a:schemeClr val="tx1"/>
+                </a:solidFill>
+                <a:latin typeface="+mn-lt"/>
+                <a:ea typeface="+mn-ea"/>
+                <a:cs typeface="+mn-cs"/>
+              </a:defRPr>
+            </a:lvl1pPr>
+            <a:lvl2pPr marL="457200" indent="-182880" algn="l" defTabSz="914400" rtl="0" eaLnBrk="1" latinLnBrk="0" hangingPunct="1">
+              <a:lnSpc>
+                <a:spcPct val="90000"/>
+              </a:lnSpc>
+              <a:spcBef>
+                <a:spcPts val="1200"/>
+              </a:spcBef>
+              <a:buClr>
+                <a:schemeClr val="accent1">
+                  <a:lumMod val="75000"/>
+                </a:schemeClr>
+              </a:buClr>
+              <a:buSzPct val="100000"/>
+              <a:buFont typeface="Arial" pitchFamily="34" charset="0"/>
+              <a:buChar char="▪"/>
+              <a:defRPr sz="1800" kern="1200">
+                <a:solidFill>
+                  <a:schemeClr val="tx1"/>
+                </a:solidFill>
+                <a:latin typeface="+mn-lt"/>
+                <a:ea typeface="+mn-ea"/>
+                <a:cs typeface="+mn-cs"/>
+              </a:defRPr>
+            </a:lvl2pPr>
+            <a:lvl3pPr marL="685800" indent="-179388" algn="l" defTabSz="914400" rtl="0" eaLnBrk="1" latinLnBrk="0" hangingPunct="1">
+              <a:lnSpc>
+                <a:spcPct val="90000"/>
+              </a:lnSpc>
+              <a:spcBef>
+                <a:spcPts val="800"/>
+              </a:spcBef>
+              <a:buClr>
+                <a:schemeClr val="accent1">
+                  <a:lumMod val="75000"/>
+                </a:schemeClr>
+              </a:buClr>
+              <a:buSzPct val="100000"/>
+              <a:buFont typeface="Arial" pitchFamily="34" charset="0"/>
+              <a:buChar char="▪"/>
+              <a:defRPr sz="1600" kern="1200">
+                <a:solidFill>
+                  <a:schemeClr val="tx1"/>
+                </a:solidFill>
+                <a:latin typeface="+mn-lt"/>
+                <a:ea typeface="+mn-ea"/>
+                <a:cs typeface="+mn-cs"/>
+              </a:defRPr>
+            </a:lvl3pPr>
+            <a:lvl4pPr marL="914400" indent="-182880" algn="l" defTabSz="914400" rtl="0" eaLnBrk="1" latinLnBrk="0" hangingPunct="1">
+              <a:lnSpc>
+                <a:spcPct val="90000"/>
+              </a:lnSpc>
+              <a:spcBef>
+                <a:spcPts val="800"/>
+              </a:spcBef>
+              <a:buClr>
+                <a:schemeClr val="accent1">
+                  <a:lumMod val="75000"/>
+                </a:schemeClr>
+              </a:buClr>
+              <a:buSzPct val="100000"/>
+              <a:buFont typeface="Arial" pitchFamily="34" charset="0"/>
+              <a:buChar char="▪"/>
+              <a:defRPr sz="1400" kern="1200">
+                <a:solidFill>
+                  <a:schemeClr val="tx1"/>
+                </a:solidFill>
+                <a:latin typeface="+mn-lt"/>
+                <a:ea typeface="+mn-ea"/>
+                <a:cs typeface="+mn-cs"/>
+              </a:defRPr>
+            </a:lvl4pPr>
+            <a:lvl5pPr marL="1143000" indent="-179388" algn="l" defTabSz="914400" rtl="0" eaLnBrk="1" latinLnBrk="0" hangingPunct="1">
+              <a:lnSpc>
+                <a:spcPct val="90000"/>
+              </a:lnSpc>
+              <a:spcBef>
+                <a:spcPts val="600"/>
+              </a:spcBef>
+              <a:buClr>
+                <a:schemeClr val="accent1">
+                  <a:lumMod val="75000"/>
+                </a:schemeClr>
+              </a:buClr>
+              <a:buSzPct val="100000"/>
+              <a:buFont typeface="Arial" pitchFamily="34" charset="0"/>
+              <a:buChar char="▪"/>
+              <a:defRPr sz="1400" kern="1200">
+                <a:solidFill>
+                  <a:schemeClr val="tx1"/>
+                </a:solidFill>
+                <a:latin typeface="+mn-lt"/>
+                <a:ea typeface="+mn-ea"/>
+                <a:cs typeface="+mn-cs"/>
+              </a:defRPr>
+            </a:lvl5pPr>
+            <a:lvl6pPr marL="1371600" indent="-182880" algn="l" defTabSz="914400" rtl="0" eaLnBrk="1" latinLnBrk="0" hangingPunct="1">
+              <a:lnSpc>
+                <a:spcPct val="90000"/>
+              </a:lnSpc>
+              <a:spcBef>
+                <a:spcPts val="600"/>
+              </a:spcBef>
+              <a:buClr>
+                <a:schemeClr val="accent1">
+                  <a:lumMod val="75000"/>
+                </a:schemeClr>
+              </a:buClr>
+              <a:buSzPct val="100000"/>
+              <a:buFont typeface="Arial" pitchFamily="34" charset="0"/>
+              <a:buChar char="▪"/>
+              <a:defRPr sz="1400" kern="1200">
+                <a:solidFill>
+                  <a:schemeClr val="tx1"/>
+                </a:solidFill>
+                <a:latin typeface="+mn-lt"/>
+                <a:ea typeface="+mn-ea"/>
+                <a:cs typeface="+mn-cs"/>
+              </a:defRPr>
+            </a:lvl6pPr>
+            <a:lvl7pPr marL="1600200" indent="-179388" algn="l" defTabSz="914400" rtl="0" eaLnBrk="1" latinLnBrk="0" hangingPunct="1">
+              <a:lnSpc>
+                <a:spcPct val="90000"/>
+              </a:lnSpc>
+              <a:spcBef>
+                <a:spcPts val="600"/>
+              </a:spcBef>
+              <a:buClr>
+                <a:schemeClr val="accent1">
+                  <a:lumMod val="75000"/>
+                </a:schemeClr>
+              </a:buClr>
+              <a:buSzPct val="100000"/>
+              <a:buFont typeface="Arial" pitchFamily="34" charset="0"/>
+              <a:buChar char="▪"/>
+              <a:defRPr sz="1400" kern="1200">
+                <a:solidFill>
+                  <a:schemeClr val="tx1"/>
+                </a:solidFill>
+                <a:latin typeface="+mn-lt"/>
+                <a:ea typeface="+mn-ea"/>
+                <a:cs typeface="+mn-cs"/>
+              </a:defRPr>
+            </a:lvl7pPr>
+            <a:lvl8pPr marL="1828800" indent="-182880" algn="l" defTabSz="914400" rtl="0" eaLnBrk="1" latinLnBrk="0" hangingPunct="1">
+              <a:lnSpc>
+                <a:spcPct val="90000"/>
+              </a:lnSpc>
+              <a:spcBef>
+                <a:spcPts val="600"/>
+              </a:spcBef>
+              <a:buClr>
+                <a:schemeClr val="accent1">
+                  <a:lumMod val="75000"/>
+                </a:schemeClr>
+              </a:buClr>
+              <a:buSzPct val="100000"/>
+              <a:buFont typeface="Arial" pitchFamily="34" charset="0"/>
+              <a:buChar char="▪"/>
+              <a:defRPr sz="1400" kern="1200">
+                <a:solidFill>
+                  <a:schemeClr val="tx1"/>
+                </a:solidFill>
+                <a:latin typeface="+mn-lt"/>
+                <a:ea typeface="+mn-ea"/>
+                <a:cs typeface="+mn-cs"/>
+              </a:defRPr>
+            </a:lvl8pPr>
+            <a:lvl9pPr marL="1878012" indent="0" algn="l" defTabSz="914400" rtl="0" eaLnBrk="1" latinLnBrk="0" hangingPunct="1">
+              <a:lnSpc>
+                <a:spcPct val="90000"/>
+              </a:lnSpc>
+              <a:spcBef>
+                <a:spcPts val="600"/>
+              </a:spcBef>
+              <a:buClr>
+                <a:schemeClr val="accent1">
+                  <a:lumMod val="75000"/>
+                </a:schemeClr>
+              </a:buClr>
+              <a:buSzPct val="100000"/>
+              <a:buFont typeface="Arial" pitchFamily="34" charset="0"/>
+              <a:buNone/>
+              <a:defRPr sz="1400" kern="1200">
+                <a:solidFill>
+                  <a:schemeClr val="tx1"/>
+                </a:solidFill>
+                <a:latin typeface="+mn-lt"/>
+                <a:ea typeface="+mn-ea"/>
+                <a:cs typeface="+mn-cs"/>
+              </a:defRPr>
+            </a:lvl9pPr>
+          </a:lstStyle>
+          <a:p>
+            <a:pPr marL="0" indent="0" algn="ctr">
+              <a:lnSpc>
+                <a:spcPct val="100000"/>
+              </a:lnSpc>
+              <a:buNone/>
+            </a:pPr>
+            <a:r>
+              <a:rPr lang="pt-BR" sz="1400" dirty="0"/>
+              <a:t>Parameters: λ = {0.3, 0.5, 0.7, 0.9}, μ = 1, N = 50, MAXT = 20000, d = {1, 2, 5, 10}</a:t>
             </a:r>
           </a:p>
         </p:txBody>
@@ -18542,7 +19386,7 @@
     </p:spTree>
     <p:extLst>
       <p:ext uri="{BB962C8B-B14F-4D97-AF65-F5344CB8AC3E}">
-        <p14:creationId xmlns:p14="http://schemas.microsoft.com/office/powerpoint/2010/main" val="2798383465"/>
+        <p14:creationId xmlns:p14="http://schemas.microsoft.com/office/powerpoint/2010/main" val="2447862790"/>
       </p:ext>
     </p:extLst>
   </p:cSld>
@@ -18586,7 +19430,7 @@
           <p:cNvPr id="2" name="Title 1">
             <a:extLst>
               <a:ext uri="{FF2B5EF4-FFF2-40B4-BE49-F238E27FC236}">
-                <a16:creationId xmlns:a16="http://schemas.microsoft.com/office/drawing/2014/main" id="{240AD2AF-C1A1-46BD-B5CB-CE9E0E3DEAC3}"/>
+                <a16:creationId xmlns:a16="http://schemas.microsoft.com/office/drawing/2014/main" id="{02893B51-4F00-07D5-10DC-BA4CC8F691DB}"/>
               </a:ext>
             </a:extLst>
           </p:cNvPr>
@@ -18597,8 +19441,8 @@
         </p:nvSpPr>
         <p:spPr>
           <a:xfrm>
-            <a:off x="589935" y="385867"/>
-            <a:ext cx="9601200" cy="931656"/>
+            <a:off x="514877" y="289039"/>
+            <a:ext cx="11326762" cy="931656"/>
           </a:xfrm>
           <a:prstGeom prst="rect">
             <a:avLst/>
@@ -18628,20 +19472,32 @@
             </a:lvl1pPr>
           </a:lstStyle>
           <a:p>
+            <a:pPr>
+              <a:lnSpc>
+                <a:spcPct val="150000"/>
+              </a:lnSpc>
+            </a:pPr>
             <a:r>
-              <a:rPr lang="en-US" dirty="0"/>
-              <a:t>Use of External Resources </a:t>
+              <a:rPr lang="en-US" sz="2900" dirty="0"/>
+              <a:t>Average Time in System (W) – Effect of Overflow Policies</a:t>
             </a:r>
+          </a:p>
+          <a:p>
+            <a:pPr>
+              <a:lnSpc>
+                <a:spcPct val="150000"/>
+              </a:lnSpc>
+            </a:pPr>
             <a:endParaRPr lang="fa-IR" dirty="0"/>
           </a:p>
         </p:txBody>
       </p:sp>
       <p:sp>
         <p:nvSpPr>
-          <p:cNvPr id="3" name="Content Placeholder 2">
+          <p:cNvPr id="5" name="Content Placeholder 2">
             <a:extLst>
               <a:ext uri="{FF2B5EF4-FFF2-40B4-BE49-F238E27FC236}">
-                <a16:creationId xmlns:a16="http://schemas.microsoft.com/office/drawing/2014/main" id="{7E2D68DB-C6EC-511A-43E7-470B4E6F46A0}"/>
+                <a16:creationId xmlns:a16="http://schemas.microsoft.com/office/drawing/2014/main" id="{8531D9FF-2931-4D1A-F35B-EA4DF8E1E8E7}"/>
               </a:ext>
             </a:extLst>
           </p:cNvPr>
@@ -18652,8 +19508,8 @@
         </p:nvSpPr>
         <p:spPr>
           <a:xfrm>
-            <a:off x="589935" y="1634613"/>
-            <a:ext cx="11012130" cy="4414683"/>
+            <a:off x="1004690" y="1916328"/>
+            <a:ext cx="10182620" cy="4159045"/>
           </a:xfrm>
           <a:prstGeom prst="rect">
             <a:avLst/>
@@ -18882,16 +19738,37 @@
             </a:lvl9pPr>
           </a:lstStyle>
           <a:p>
-            <a:pPr algn="just">
+            <a:pPr marL="0" indent="0" algn="just">
               <a:lnSpc>
                 <a:spcPct val="150000"/>
               </a:lnSpc>
-              <a:buFont typeface="Wingdings" panose="05000000000000000000" pitchFamily="2" charset="2"/>
-              <a:buChar char="§"/>
+              <a:buNone/>
             </a:pPr>
             <a:r>
               <a:rPr lang="en-US" sz="1400" dirty="0"/>
-              <a:t>This assignment was completed individually.</a:t>
+              <a:t>Following peer review feedback, we extended the evaluation by analyzing the average time spent in the system (W), including the impact of different overflow policies.</a:t>
+            </a:r>
+          </a:p>
+          <a:p>
+            <a:pPr marL="0" indent="0" algn="just">
+              <a:lnSpc>
+                <a:spcPct val="150000"/>
+              </a:lnSpc>
+              <a:buNone/>
+            </a:pPr>
+            <a:endParaRPr lang="en-US" sz="1400" dirty="0"/>
+          </a:p>
+          <a:p>
+            <a:pPr algn="just">
+              <a:lnSpc>
+                <a:spcPct val="150000"/>
+              </a:lnSpc>
+              <a:buFont typeface="Arial" panose="020B0604020202020204" pitchFamily="34" charset="0"/>
+              <a:buChar char="•"/>
+            </a:pPr>
+            <a:r>
+              <a:rPr lang="en-US" sz="1400" dirty="0"/>
+              <a:t>Increasing d significantly reduces the average time spent in the system (W) in all configurations.</a:t>
             </a:r>
           </a:p>
           <a:p>
@@ -18899,12 +19776,12 @@
               <a:lnSpc>
                 <a:spcPct val="150000"/>
               </a:lnSpc>
-              <a:buFont typeface="Wingdings" panose="05000000000000000000" pitchFamily="2" charset="2"/>
-              <a:buChar char="§"/>
+              <a:buFont typeface="Arial" panose="020B0604020202020204" pitchFamily="34" charset="0"/>
+              <a:buChar char="•"/>
             </a:pPr>
             <a:r>
               <a:rPr lang="en-US" sz="1400" dirty="0"/>
-              <a:t>Large language models (ChatGPT) were extensively used as a support and learning tool, both to understand how the provided.</a:t>
+              <a:t>The drop policy achieves the lowest W by discarding jobs when queues are full, at the cost of increased job loss.</a:t>
             </a:r>
           </a:p>
           <a:p>
@@ -18912,72 +19789,562 @@
               <a:lnSpc>
                 <a:spcPct val="150000"/>
               </a:lnSpc>
-              <a:buFont typeface="Wingdings" panose="05000000000000000000" pitchFamily="2" charset="2"/>
-              <a:buChar char="§"/>
+              <a:buFont typeface="Arial" panose="020B0604020202020204" pitchFamily="34" charset="0"/>
+              <a:buChar char="•"/>
             </a:pPr>
             <a:r>
               <a:rPr lang="en-US" sz="1400" dirty="0"/>
-              <a:t>simulator code works and to assist in the implementation of the assignment, including writing and modifying parts of the code.</a:t>
+              <a:t>The retry policy (Max</a:t>
             </a:r>
+            <a:r>
+              <a:rPr lang="fa-IR" sz="1400" dirty="0"/>
+              <a:t> </a:t>
+            </a:r>
+            <a:r>
+              <a:rPr lang="en-US" sz="1400" dirty="0"/>
+              <a:t>Retries = 3) introduces additional load but provides a good trade-off between latency and reliability, drastically reducing the drop rate with a moderate increase in W.</a:t>
+            </a:r>
+            <a:endParaRPr lang="fa-IR" sz="1400" dirty="0"/>
           </a:p>
           <a:p>
             <a:pPr algn="just">
               <a:lnSpc>
                 <a:spcPct val="150000"/>
               </a:lnSpc>
-              <a:buFont typeface="Wingdings" panose="05000000000000000000" pitchFamily="2" charset="2"/>
-              <a:buChar char="§"/>
+              <a:buFont typeface="Arial" panose="020B0604020202020204" pitchFamily="34" charset="0"/>
+              <a:buChar char="•"/>
             </a:pPr>
-            <a:r>
-              <a:rPr lang="en-US" sz="1400" dirty="0"/>
-              <a:t>ChatGPT was also used to help with Python syntax, code structuring, and implementation ideas, due to limited prior experience with Python.</a:t>
-            </a:r>
+            <a:endParaRPr lang="fa-IR" sz="1400" dirty="0"/>
           </a:p>
           <a:p>
             <a:pPr algn="just">
               <a:lnSpc>
                 <a:spcPct val="150000"/>
               </a:lnSpc>
-              <a:buFont typeface="Wingdings" panose="05000000000000000000" pitchFamily="2" charset="2"/>
-              <a:buChar char="§"/>
+              <a:buFont typeface="Arial" panose="020B0604020202020204" pitchFamily="34" charset="0"/>
+              <a:buChar char="•"/>
             </a:pPr>
-            <a:r>
-              <a:rPr lang="en-US" sz="1400" dirty="0"/>
-              <a:t>In addition, ChatGPT was used to support the writing of the report, helping with structure, clarity, and grammatical correctness.</a:t>
-            </a:r>
+            <a:endParaRPr lang="fa-IR" sz="1400" dirty="0"/>
           </a:p>
+        </p:txBody>
+      </p:sp>
+      <p:sp>
+        <p:nvSpPr>
+          <p:cNvPr id="6" name="Content Placeholder 2">
+            <a:extLst>
+              <a:ext uri="{FF2B5EF4-FFF2-40B4-BE49-F238E27FC236}">
+                <a16:creationId xmlns:a16="http://schemas.microsoft.com/office/drawing/2014/main" id="{5690EC64-4B02-4484-5084-CF5099DD1F19}"/>
+              </a:ext>
+            </a:extLst>
+          </p:cNvPr>
+          <p:cNvSpPr txBox="1">
+            <a:spLocks/>
+          </p:cNvSpPr>
+          <p:nvPr/>
+        </p:nvSpPr>
+        <p:spPr>
+          <a:xfrm>
+            <a:off x="5553909" y="2534265"/>
+            <a:ext cx="6833419" cy="4414683"/>
+          </a:xfrm>
+          <a:prstGeom prst="rect">
+            <a:avLst/>
+          </a:prstGeom>
+        </p:spPr>
+        <p:txBody>
+          <a:bodyPr>
+            <a:noAutofit/>
+          </a:bodyPr>
+          <a:lstStyle>
+            <a:lvl1pPr marL="228600" indent="-228600" algn="l" defTabSz="914400" rtl="0" eaLnBrk="1" latinLnBrk="0" hangingPunct="1">
+              <a:lnSpc>
+                <a:spcPct val="90000"/>
+              </a:lnSpc>
+              <a:spcBef>
+                <a:spcPts val="1800"/>
+              </a:spcBef>
+              <a:buClr>
+                <a:schemeClr val="accent1">
+                  <a:lumMod val="75000"/>
+                </a:schemeClr>
+              </a:buClr>
+              <a:buSzPct val="100000"/>
+              <a:buFont typeface="Arial" pitchFamily="34" charset="0"/>
+              <a:buChar char="▪"/>
+              <a:defRPr sz="2000" kern="1200">
+                <a:solidFill>
+                  <a:schemeClr val="tx1"/>
+                </a:solidFill>
+                <a:latin typeface="+mn-lt"/>
+                <a:ea typeface="+mn-ea"/>
+                <a:cs typeface="+mn-cs"/>
+              </a:defRPr>
+            </a:lvl1pPr>
+            <a:lvl2pPr marL="457200" indent="-182880" algn="l" defTabSz="914400" rtl="0" eaLnBrk="1" latinLnBrk="0" hangingPunct="1">
+              <a:lnSpc>
+                <a:spcPct val="90000"/>
+              </a:lnSpc>
+              <a:spcBef>
+                <a:spcPts val="1200"/>
+              </a:spcBef>
+              <a:buClr>
+                <a:schemeClr val="accent1">
+                  <a:lumMod val="75000"/>
+                </a:schemeClr>
+              </a:buClr>
+              <a:buSzPct val="100000"/>
+              <a:buFont typeface="Arial" pitchFamily="34" charset="0"/>
+              <a:buChar char="▪"/>
+              <a:defRPr sz="1800" kern="1200">
+                <a:solidFill>
+                  <a:schemeClr val="tx1"/>
+                </a:solidFill>
+                <a:latin typeface="+mn-lt"/>
+                <a:ea typeface="+mn-ea"/>
+                <a:cs typeface="+mn-cs"/>
+              </a:defRPr>
+            </a:lvl2pPr>
+            <a:lvl3pPr marL="685800" indent="-179388" algn="l" defTabSz="914400" rtl="0" eaLnBrk="1" latinLnBrk="0" hangingPunct="1">
+              <a:lnSpc>
+                <a:spcPct val="90000"/>
+              </a:lnSpc>
+              <a:spcBef>
+                <a:spcPts val="800"/>
+              </a:spcBef>
+              <a:buClr>
+                <a:schemeClr val="accent1">
+                  <a:lumMod val="75000"/>
+                </a:schemeClr>
+              </a:buClr>
+              <a:buSzPct val="100000"/>
+              <a:buFont typeface="Arial" pitchFamily="34" charset="0"/>
+              <a:buChar char="▪"/>
+              <a:defRPr sz="1600" kern="1200">
+                <a:solidFill>
+                  <a:schemeClr val="tx1"/>
+                </a:solidFill>
+                <a:latin typeface="+mn-lt"/>
+                <a:ea typeface="+mn-ea"/>
+                <a:cs typeface="+mn-cs"/>
+              </a:defRPr>
+            </a:lvl3pPr>
+            <a:lvl4pPr marL="914400" indent="-182880" algn="l" defTabSz="914400" rtl="0" eaLnBrk="1" latinLnBrk="0" hangingPunct="1">
+              <a:lnSpc>
+                <a:spcPct val="90000"/>
+              </a:lnSpc>
+              <a:spcBef>
+                <a:spcPts val="800"/>
+              </a:spcBef>
+              <a:buClr>
+                <a:schemeClr val="accent1">
+                  <a:lumMod val="75000"/>
+                </a:schemeClr>
+              </a:buClr>
+              <a:buSzPct val="100000"/>
+              <a:buFont typeface="Arial" pitchFamily="34" charset="0"/>
+              <a:buChar char="▪"/>
+              <a:defRPr sz="1400" kern="1200">
+                <a:solidFill>
+                  <a:schemeClr val="tx1"/>
+                </a:solidFill>
+                <a:latin typeface="+mn-lt"/>
+                <a:ea typeface="+mn-ea"/>
+                <a:cs typeface="+mn-cs"/>
+              </a:defRPr>
+            </a:lvl4pPr>
+            <a:lvl5pPr marL="1143000" indent="-179388" algn="l" defTabSz="914400" rtl="0" eaLnBrk="1" latinLnBrk="0" hangingPunct="1">
+              <a:lnSpc>
+                <a:spcPct val="90000"/>
+              </a:lnSpc>
+              <a:spcBef>
+                <a:spcPts val="600"/>
+              </a:spcBef>
+              <a:buClr>
+                <a:schemeClr val="accent1">
+                  <a:lumMod val="75000"/>
+                </a:schemeClr>
+              </a:buClr>
+              <a:buSzPct val="100000"/>
+              <a:buFont typeface="Arial" pitchFamily="34" charset="0"/>
+              <a:buChar char="▪"/>
+              <a:defRPr sz="1400" kern="1200">
+                <a:solidFill>
+                  <a:schemeClr val="tx1"/>
+                </a:solidFill>
+                <a:latin typeface="+mn-lt"/>
+                <a:ea typeface="+mn-ea"/>
+                <a:cs typeface="+mn-cs"/>
+              </a:defRPr>
+            </a:lvl5pPr>
+            <a:lvl6pPr marL="1371600" indent="-182880" algn="l" defTabSz="914400" rtl="0" eaLnBrk="1" latinLnBrk="0" hangingPunct="1">
+              <a:lnSpc>
+                <a:spcPct val="90000"/>
+              </a:lnSpc>
+              <a:spcBef>
+                <a:spcPts val="600"/>
+              </a:spcBef>
+              <a:buClr>
+                <a:schemeClr val="accent1">
+                  <a:lumMod val="75000"/>
+                </a:schemeClr>
+              </a:buClr>
+              <a:buSzPct val="100000"/>
+              <a:buFont typeface="Arial" pitchFamily="34" charset="0"/>
+              <a:buChar char="▪"/>
+              <a:defRPr sz="1400" kern="1200">
+                <a:solidFill>
+                  <a:schemeClr val="tx1"/>
+                </a:solidFill>
+                <a:latin typeface="+mn-lt"/>
+                <a:ea typeface="+mn-ea"/>
+                <a:cs typeface="+mn-cs"/>
+              </a:defRPr>
+            </a:lvl6pPr>
+            <a:lvl7pPr marL="1600200" indent="-179388" algn="l" defTabSz="914400" rtl="0" eaLnBrk="1" latinLnBrk="0" hangingPunct="1">
+              <a:lnSpc>
+                <a:spcPct val="90000"/>
+              </a:lnSpc>
+              <a:spcBef>
+                <a:spcPts val="600"/>
+              </a:spcBef>
+              <a:buClr>
+                <a:schemeClr val="accent1">
+                  <a:lumMod val="75000"/>
+                </a:schemeClr>
+              </a:buClr>
+              <a:buSzPct val="100000"/>
+              <a:buFont typeface="Arial" pitchFamily="34" charset="0"/>
+              <a:buChar char="▪"/>
+              <a:defRPr sz="1400" kern="1200">
+                <a:solidFill>
+                  <a:schemeClr val="tx1"/>
+                </a:solidFill>
+                <a:latin typeface="+mn-lt"/>
+                <a:ea typeface="+mn-ea"/>
+                <a:cs typeface="+mn-cs"/>
+              </a:defRPr>
+            </a:lvl7pPr>
+            <a:lvl8pPr marL="1828800" indent="-182880" algn="l" defTabSz="914400" rtl="0" eaLnBrk="1" latinLnBrk="0" hangingPunct="1">
+              <a:lnSpc>
+                <a:spcPct val="90000"/>
+              </a:lnSpc>
+              <a:spcBef>
+                <a:spcPts val="600"/>
+              </a:spcBef>
+              <a:buClr>
+                <a:schemeClr val="accent1">
+                  <a:lumMod val="75000"/>
+                </a:schemeClr>
+              </a:buClr>
+              <a:buSzPct val="100000"/>
+              <a:buFont typeface="Arial" pitchFamily="34" charset="0"/>
+              <a:buChar char="▪"/>
+              <a:defRPr sz="1400" kern="1200">
+                <a:solidFill>
+                  <a:schemeClr val="tx1"/>
+                </a:solidFill>
+                <a:latin typeface="+mn-lt"/>
+                <a:ea typeface="+mn-ea"/>
+                <a:cs typeface="+mn-cs"/>
+              </a:defRPr>
+            </a:lvl8pPr>
+            <a:lvl9pPr marL="1878012" indent="0" algn="l" defTabSz="914400" rtl="0" eaLnBrk="1" latinLnBrk="0" hangingPunct="1">
+              <a:lnSpc>
+                <a:spcPct val="90000"/>
+              </a:lnSpc>
+              <a:spcBef>
+                <a:spcPts val="600"/>
+              </a:spcBef>
+              <a:buClr>
+                <a:schemeClr val="accent1">
+                  <a:lumMod val="75000"/>
+                </a:schemeClr>
+              </a:buClr>
+              <a:buSzPct val="100000"/>
+              <a:buFont typeface="Arial" pitchFamily="34" charset="0"/>
+              <a:buNone/>
+              <a:defRPr sz="1400" kern="1200">
+                <a:solidFill>
+                  <a:schemeClr val="tx1"/>
+                </a:solidFill>
+                <a:latin typeface="+mn-lt"/>
+                <a:ea typeface="+mn-ea"/>
+                <a:cs typeface="+mn-cs"/>
+              </a:defRPr>
+            </a:lvl9pPr>
+          </a:lstStyle>
           <a:p>
             <a:pPr algn="just">
               <a:lnSpc>
                 <a:spcPct val="150000"/>
               </a:lnSpc>
-              <a:buFont typeface="Wingdings" panose="05000000000000000000" pitchFamily="2" charset="2"/>
-              <a:buChar char="§"/>
+              <a:buFont typeface="Arial" panose="020B0604020202020204" pitchFamily="34" charset="0"/>
+              <a:buChar char="•"/>
             </a:pPr>
-            <a:r>
-              <a:rPr lang="en-US" sz="1400" dirty="0"/>
-              <a:t>Gemini was occasionally used to clarify specific theoretical concepts.</a:t>
-            </a:r>
+            <a:endParaRPr lang="en-US" sz="1400" dirty="0"/>
           </a:p>
+        </p:txBody>
+      </p:sp>
+      <p:sp>
+        <p:nvSpPr>
+          <p:cNvPr id="7" name="Content Placeholder 2">
+            <a:extLst>
+              <a:ext uri="{FF2B5EF4-FFF2-40B4-BE49-F238E27FC236}">
+                <a16:creationId xmlns:a16="http://schemas.microsoft.com/office/drawing/2014/main" id="{683B1BC7-5676-FC64-B6D6-1D8379EB637B}"/>
+              </a:ext>
+            </a:extLst>
+          </p:cNvPr>
+          <p:cNvSpPr txBox="1">
+            <a:spLocks/>
+          </p:cNvSpPr>
+          <p:nvPr/>
+        </p:nvSpPr>
+        <p:spPr>
+          <a:xfrm>
+            <a:off x="604026" y="1377770"/>
+            <a:ext cx="9899766" cy="999420"/>
+          </a:xfrm>
+          <a:prstGeom prst="rect">
+            <a:avLst/>
+          </a:prstGeom>
+        </p:spPr>
+        <p:txBody>
+          <a:bodyPr>
+            <a:noAutofit/>
+          </a:bodyPr>
+          <a:lstStyle>
+            <a:lvl1pPr marL="228600" indent="-228600" algn="l" defTabSz="914400" rtl="0" eaLnBrk="1" latinLnBrk="0" hangingPunct="1">
+              <a:lnSpc>
+                <a:spcPct val="90000"/>
+              </a:lnSpc>
+              <a:spcBef>
+                <a:spcPts val="1800"/>
+              </a:spcBef>
+              <a:buClr>
+                <a:schemeClr val="accent1">
+                  <a:lumMod val="75000"/>
+                </a:schemeClr>
+              </a:buClr>
+              <a:buSzPct val="100000"/>
+              <a:buFont typeface="Arial" pitchFamily="34" charset="0"/>
+              <a:buChar char="▪"/>
+              <a:defRPr sz="2000" kern="1200">
+                <a:solidFill>
+                  <a:schemeClr val="tx1"/>
+                </a:solidFill>
+                <a:latin typeface="+mn-lt"/>
+                <a:ea typeface="+mn-ea"/>
+                <a:cs typeface="+mn-cs"/>
+              </a:defRPr>
+            </a:lvl1pPr>
+            <a:lvl2pPr marL="457200" indent="-182880" algn="l" defTabSz="914400" rtl="0" eaLnBrk="1" latinLnBrk="0" hangingPunct="1">
+              <a:lnSpc>
+                <a:spcPct val="90000"/>
+              </a:lnSpc>
+              <a:spcBef>
+                <a:spcPts val="1200"/>
+              </a:spcBef>
+              <a:buClr>
+                <a:schemeClr val="accent1">
+                  <a:lumMod val="75000"/>
+                </a:schemeClr>
+              </a:buClr>
+              <a:buSzPct val="100000"/>
+              <a:buFont typeface="Arial" pitchFamily="34" charset="0"/>
+              <a:buChar char="▪"/>
+              <a:defRPr sz="1800" kern="1200">
+                <a:solidFill>
+                  <a:schemeClr val="tx1"/>
+                </a:solidFill>
+                <a:latin typeface="+mn-lt"/>
+                <a:ea typeface="+mn-ea"/>
+                <a:cs typeface="+mn-cs"/>
+              </a:defRPr>
+            </a:lvl2pPr>
+            <a:lvl3pPr marL="685800" indent="-179388" algn="l" defTabSz="914400" rtl="0" eaLnBrk="1" latinLnBrk="0" hangingPunct="1">
+              <a:lnSpc>
+                <a:spcPct val="90000"/>
+              </a:lnSpc>
+              <a:spcBef>
+                <a:spcPts val="800"/>
+              </a:spcBef>
+              <a:buClr>
+                <a:schemeClr val="accent1">
+                  <a:lumMod val="75000"/>
+                </a:schemeClr>
+              </a:buClr>
+              <a:buSzPct val="100000"/>
+              <a:buFont typeface="Arial" pitchFamily="34" charset="0"/>
+              <a:buChar char="▪"/>
+              <a:defRPr sz="1600" kern="1200">
+                <a:solidFill>
+                  <a:schemeClr val="tx1"/>
+                </a:solidFill>
+                <a:latin typeface="+mn-lt"/>
+                <a:ea typeface="+mn-ea"/>
+                <a:cs typeface="+mn-cs"/>
+              </a:defRPr>
+            </a:lvl3pPr>
+            <a:lvl4pPr marL="914400" indent="-182880" algn="l" defTabSz="914400" rtl="0" eaLnBrk="1" latinLnBrk="0" hangingPunct="1">
+              <a:lnSpc>
+                <a:spcPct val="90000"/>
+              </a:lnSpc>
+              <a:spcBef>
+                <a:spcPts val="800"/>
+              </a:spcBef>
+              <a:buClr>
+                <a:schemeClr val="accent1">
+                  <a:lumMod val="75000"/>
+                </a:schemeClr>
+              </a:buClr>
+              <a:buSzPct val="100000"/>
+              <a:buFont typeface="Arial" pitchFamily="34" charset="0"/>
+              <a:buChar char="▪"/>
+              <a:defRPr sz="1400" kern="1200">
+                <a:solidFill>
+                  <a:schemeClr val="tx1"/>
+                </a:solidFill>
+                <a:latin typeface="+mn-lt"/>
+                <a:ea typeface="+mn-ea"/>
+                <a:cs typeface="+mn-cs"/>
+              </a:defRPr>
+            </a:lvl4pPr>
+            <a:lvl5pPr marL="1143000" indent="-179388" algn="l" defTabSz="914400" rtl="0" eaLnBrk="1" latinLnBrk="0" hangingPunct="1">
+              <a:lnSpc>
+                <a:spcPct val="90000"/>
+              </a:lnSpc>
+              <a:spcBef>
+                <a:spcPts val="600"/>
+              </a:spcBef>
+              <a:buClr>
+                <a:schemeClr val="accent1">
+                  <a:lumMod val="75000"/>
+                </a:schemeClr>
+              </a:buClr>
+              <a:buSzPct val="100000"/>
+              <a:buFont typeface="Arial" pitchFamily="34" charset="0"/>
+              <a:buChar char="▪"/>
+              <a:defRPr sz="1400" kern="1200">
+                <a:solidFill>
+                  <a:schemeClr val="tx1"/>
+                </a:solidFill>
+                <a:latin typeface="+mn-lt"/>
+                <a:ea typeface="+mn-ea"/>
+                <a:cs typeface="+mn-cs"/>
+              </a:defRPr>
+            </a:lvl5pPr>
+            <a:lvl6pPr marL="1371600" indent="-182880" algn="l" defTabSz="914400" rtl="0" eaLnBrk="1" latinLnBrk="0" hangingPunct="1">
+              <a:lnSpc>
+                <a:spcPct val="90000"/>
+              </a:lnSpc>
+              <a:spcBef>
+                <a:spcPts val="600"/>
+              </a:spcBef>
+              <a:buClr>
+                <a:schemeClr val="accent1">
+                  <a:lumMod val="75000"/>
+                </a:schemeClr>
+              </a:buClr>
+              <a:buSzPct val="100000"/>
+              <a:buFont typeface="Arial" pitchFamily="34" charset="0"/>
+              <a:buChar char="▪"/>
+              <a:defRPr sz="1400" kern="1200">
+                <a:solidFill>
+                  <a:schemeClr val="tx1"/>
+                </a:solidFill>
+                <a:latin typeface="+mn-lt"/>
+                <a:ea typeface="+mn-ea"/>
+                <a:cs typeface="+mn-cs"/>
+              </a:defRPr>
+            </a:lvl6pPr>
+            <a:lvl7pPr marL="1600200" indent="-179388" algn="l" defTabSz="914400" rtl="0" eaLnBrk="1" latinLnBrk="0" hangingPunct="1">
+              <a:lnSpc>
+                <a:spcPct val="90000"/>
+              </a:lnSpc>
+              <a:spcBef>
+                <a:spcPts val="600"/>
+              </a:spcBef>
+              <a:buClr>
+                <a:schemeClr val="accent1">
+                  <a:lumMod val="75000"/>
+                </a:schemeClr>
+              </a:buClr>
+              <a:buSzPct val="100000"/>
+              <a:buFont typeface="Arial" pitchFamily="34" charset="0"/>
+              <a:buChar char="▪"/>
+              <a:defRPr sz="1400" kern="1200">
+                <a:solidFill>
+                  <a:schemeClr val="tx1"/>
+                </a:solidFill>
+                <a:latin typeface="+mn-lt"/>
+                <a:ea typeface="+mn-ea"/>
+                <a:cs typeface="+mn-cs"/>
+              </a:defRPr>
+            </a:lvl7pPr>
+            <a:lvl8pPr marL="1828800" indent="-182880" algn="l" defTabSz="914400" rtl="0" eaLnBrk="1" latinLnBrk="0" hangingPunct="1">
+              <a:lnSpc>
+                <a:spcPct val="90000"/>
+              </a:lnSpc>
+              <a:spcBef>
+                <a:spcPts val="600"/>
+              </a:spcBef>
+              <a:buClr>
+                <a:schemeClr val="accent1">
+                  <a:lumMod val="75000"/>
+                </a:schemeClr>
+              </a:buClr>
+              <a:buSzPct val="100000"/>
+              <a:buFont typeface="Arial" pitchFamily="34" charset="0"/>
+              <a:buChar char="▪"/>
+              <a:defRPr sz="1400" kern="1200">
+                <a:solidFill>
+                  <a:schemeClr val="tx1"/>
+                </a:solidFill>
+                <a:latin typeface="+mn-lt"/>
+                <a:ea typeface="+mn-ea"/>
+                <a:cs typeface="+mn-cs"/>
+              </a:defRPr>
+            </a:lvl8pPr>
+            <a:lvl9pPr marL="1878012" indent="0" algn="l" defTabSz="914400" rtl="0" eaLnBrk="1" latinLnBrk="0" hangingPunct="1">
+              <a:lnSpc>
+                <a:spcPct val="90000"/>
+              </a:lnSpc>
+              <a:spcBef>
+                <a:spcPts val="600"/>
+              </a:spcBef>
+              <a:buClr>
+                <a:schemeClr val="accent1">
+                  <a:lumMod val="75000"/>
+                </a:schemeClr>
+              </a:buClr>
+              <a:buSzPct val="100000"/>
+              <a:buFont typeface="Arial" pitchFamily="34" charset="0"/>
+              <a:buNone/>
+              <a:defRPr sz="1400" kern="1200">
+                <a:solidFill>
+                  <a:schemeClr val="tx1"/>
+                </a:solidFill>
+                <a:latin typeface="+mn-lt"/>
+                <a:ea typeface="+mn-ea"/>
+                <a:cs typeface="+mn-cs"/>
+              </a:defRPr>
+            </a:lvl9pPr>
+          </a:lstStyle>
           <a:p>
-            <a:pPr algn="just">
+            <a:pPr marL="0" indent="0" algn="just">
               <a:lnSpc>
                 <a:spcPct val="150000"/>
               </a:lnSpc>
-              <a:buFont typeface="Wingdings" panose="05000000000000000000" pitchFamily="2" charset="2"/>
-              <a:buChar char="§"/>
+              <a:buNone/>
             </a:pPr>
-            <a:r>
-              <a:rPr lang="en-US" sz="1400" dirty="0"/>
-              <a:t>All design decisions, simulator modifications and experimental setups were independently carried out by the author.</a:t>
-            </a:r>
+            <a:endParaRPr lang="en-US" sz="1400" dirty="0"/>
           </a:p>
         </p:txBody>
       </p:sp>
     </p:spTree>
     <p:extLst>
       <p:ext uri="{BB962C8B-B14F-4D97-AF65-F5344CB8AC3E}">
-        <p14:creationId xmlns:p14="http://schemas.microsoft.com/office/powerpoint/2010/main" val="375780580"/>
+        <p14:creationId xmlns:p14="http://schemas.microsoft.com/office/powerpoint/2010/main" val="853938821"/>
       </p:ext>
     </p:extLst>
   </p:cSld>
@@ -19021,6 +20388,867 @@
           <p:cNvPr id="2" name="Title 1">
             <a:extLst>
               <a:ext uri="{FF2B5EF4-FFF2-40B4-BE49-F238E27FC236}">
+                <a16:creationId xmlns:a16="http://schemas.microsoft.com/office/drawing/2014/main" id="{83D1E796-97AF-FE5F-34A7-B1C74FD64868}"/>
+              </a:ext>
+            </a:extLst>
+          </p:cNvPr>
+          <p:cNvSpPr txBox="1">
+            <a:spLocks/>
+          </p:cNvSpPr>
+          <p:nvPr/>
+        </p:nvSpPr>
+        <p:spPr>
+          <a:xfrm>
+            <a:off x="589935" y="385867"/>
+            <a:ext cx="9601200" cy="931656"/>
+          </a:xfrm>
+          <a:prstGeom prst="rect">
+            <a:avLst/>
+          </a:prstGeom>
+        </p:spPr>
+        <p:txBody>
+          <a:bodyPr/>
+          <a:lstStyle>
+            <a:lvl1pPr algn="l" defTabSz="914400" rtl="0" eaLnBrk="1" latinLnBrk="0" hangingPunct="1">
+              <a:lnSpc>
+                <a:spcPct val="90000"/>
+              </a:lnSpc>
+              <a:spcBef>
+                <a:spcPct val="0"/>
+              </a:spcBef>
+              <a:buNone/>
+              <a:defRPr sz="3200" b="1" kern="1200">
+                <a:solidFill>
+                  <a:schemeClr val="accent1">
+                    <a:lumMod val="75000"/>
+                  </a:schemeClr>
+                </a:solidFill>
+                <a:latin typeface="+mj-lt"/>
+                <a:ea typeface="+mj-ea"/>
+                <a:cs typeface="+mj-cs"/>
+              </a:defRPr>
+            </a:lvl1pPr>
+          </a:lstStyle>
+          <a:p>
+            <a:r>
+              <a:rPr lang="en-US" dirty="0"/>
+              <a:t>Effect of the Extension </a:t>
+            </a:r>
+            <a:endParaRPr lang="fa-IR" dirty="0"/>
+          </a:p>
+        </p:txBody>
+      </p:sp>
+      <p:sp>
+        <p:nvSpPr>
+          <p:cNvPr id="3" name="Content Placeholder 2">
+            <a:extLst>
+              <a:ext uri="{FF2B5EF4-FFF2-40B4-BE49-F238E27FC236}">
+                <a16:creationId xmlns:a16="http://schemas.microsoft.com/office/drawing/2014/main" id="{B1B8C4E8-45F5-AFB0-5F5E-9055B8F5927A}"/>
+              </a:ext>
+            </a:extLst>
+          </p:cNvPr>
+          <p:cNvSpPr txBox="1">
+            <a:spLocks/>
+          </p:cNvSpPr>
+          <p:nvPr/>
+        </p:nvSpPr>
+        <p:spPr>
+          <a:xfrm>
+            <a:off x="589935" y="1221658"/>
+            <a:ext cx="6833419" cy="4414683"/>
+          </a:xfrm>
+          <a:prstGeom prst="rect">
+            <a:avLst/>
+          </a:prstGeom>
+        </p:spPr>
+        <p:txBody>
+          <a:bodyPr>
+            <a:noAutofit/>
+          </a:bodyPr>
+          <a:lstStyle>
+            <a:lvl1pPr marL="228600" indent="-228600" algn="l" defTabSz="914400" rtl="0" eaLnBrk="1" latinLnBrk="0" hangingPunct="1">
+              <a:lnSpc>
+                <a:spcPct val="90000"/>
+              </a:lnSpc>
+              <a:spcBef>
+                <a:spcPts val="1800"/>
+              </a:spcBef>
+              <a:buClr>
+                <a:schemeClr val="accent1">
+                  <a:lumMod val="75000"/>
+                </a:schemeClr>
+              </a:buClr>
+              <a:buSzPct val="100000"/>
+              <a:buFont typeface="Arial" pitchFamily="34" charset="0"/>
+              <a:buChar char="▪"/>
+              <a:defRPr sz="2000" kern="1200">
+                <a:solidFill>
+                  <a:schemeClr val="tx1"/>
+                </a:solidFill>
+                <a:latin typeface="+mn-lt"/>
+                <a:ea typeface="+mn-ea"/>
+                <a:cs typeface="+mn-cs"/>
+              </a:defRPr>
+            </a:lvl1pPr>
+            <a:lvl2pPr marL="457200" indent="-182880" algn="l" defTabSz="914400" rtl="0" eaLnBrk="1" latinLnBrk="0" hangingPunct="1">
+              <a:lnSpc>
+                <a:spcPct val="90000"/>
+              </a:lnSpc>
+              <a:spcBef>
+                <a:spcPts val="1200"/>
+              </a:spcBef>
+              <a:buClr>
+                <a:schemeClr val="accent1">
+                  <a:lumMod val="75000"/>
+                </a:schemeClr>
+              </a:buClr>
+              <a:buSzPct val="100000"/>
+              <a:buFont typeface="Arial" pitchFamily="34" charset="0"/>
+              <a:buChar char="▪"/>
+              <a:defRPr sz="1800" kern="1200">
+                <a:solidFill>
+                  <a:schemeClr val="tx1"/>
+                </a:solidFill>
+                <a:latin typeface="+mn-lt"/>
+                <a:ea typeface="+mn-ea"/>
+                <a:cs typeface="+mn-cs"/>
+              </a:defRPr>
+            </a:lvl2pPr>
+            <a:lvl3pPr marL="685800" indent="-179388" algn="l" defTabSz="914400" rtl="0" eaLnBrk="1" latinLnBrk="0" hangingPunct="1">
+              <a:lnSpc>
+                <a:spcPct val="90000"/>
+              </a:lnSpc>
+              <a:spcBef>
+                <a:spcPts val="800"/>
+              </a:spcBef>
+              <a:buClr>
+                <a:schemeClr val="accent1">
+                  <a:lumMod val="75000"/>
+                </a:schemeClr>
+              </a:buClr>
+              <a:buSzPct val="100000"/>
+              <a:buFont typeface="Arial" pitchFamily="34" charset="0"/>
+              <a:buChar char="▪"/>
+              <a:defRPr sz="1600" kern="1200">
+                <a:solidFill>
+                  <a:schemeClr val="tx1"/>
+                </a:solidFill>
+                <a:latin typeface="+mn-lt"/>
+                <a:ea typeface="+mn-ea"/>
+                <a:cs typeface="+mn-cs"/>
+              </a:defRPr>
+            </a:lvl3pPr>
+            <a:lvl4pPr marL="914400" indent="-182880" algn="l" defTabSz="914400" rtl="0" eaLnBrk="1" latinLnBrk="0" hangingPunct="1">
+              <a:lnSpc>
+                <a:spcPct val="90000"/>
+              </a:lnSpc>
+              <a:spcBef>
+                <a:spcPts val="800"/>
+              </a:spcBef>
+              <a:buClr>
+                <a:schemeClr val="accent1">
+                  <a:lumMod val="75000"/>
+                </a:schemeClr>
+              </a:buClr>
+              <a:buSzPct val="100000"/>
+              <a:buFont typeface="Arial" pitchFamily="34" charset="0"/>
+              <a:buChar char="▪"/>
+              <a:defRPr sz="1400" kern="1200">
+                <a:solidFill>
+                  <a:schemeClr val="tx1"/>
+                </a:solidFill>
+                <a:latin typeface="+mn-lt"/>
+                <a:ea typeface="+mn-ea"/>
+                <a:cs typeface="+mn-cs"/>
+              </a:defRPr>
+            </a:lvl4pPr>
+            <a:lvl5pPr marL="1143000" indent="-179388" algn="l" defTabSz="914400" rtl="0" eaLnBrk="1" latinLnBrk="0" hangingPunct="1">
+              <a:lnSpc>
+                <a:spcPct val="90000"/>
+              </a:lnSpc>
+              <a:spcBef>
+                <a:spcPts val="600"/>
+              </a:spcBef>
+              <a:buClr>
+                <a:schemeClr val="accent1">
+                  <a:lumMod val="75000"/>
+                </a:schemeClr>
+              </a:buClr>
+              <a:buSzPct val="100000"/>
+              <a:buFont typeface="Arial" pitchFamily="34" charset="0"/>
+              <a:buChar char="▪"/>
+              <a:defRPr sz="1400" kern="1200">
+                <a:solidFill>
+                  <a:schemeClr val="tx1"/>
+                </a:solidFill>
+                <a:latin typeface="+mn-lt"/>
+                <a:ea typeface="+mn-ea"/>
+                <a:cs typeface="+mn-cs"/>
+              </a:defRPr>
+            </a:lvl5pPr>
+            <a:lvl6pPr marL="1371600" indent="-182880" algn="l" defTabSz="914400" rtl="0" eaLnBrk="1" latinLnBrk="0" hangingPunct="1">
+              <a:lnSpc>
+                <a:spcPct val="90000"/>
+              </a:lnSpc>
+              <a:spcBef>
+                <a:spcPts val="600"/>
+              </a:spcBef>
+              <a:buClr>
+                <a:schemeClr val="accent1">
+                  <a:lumMod val="75000"/>
+                </a:schemeClr>
+              </a:buClr>
+              <a:buSzPct val="100000"/>
+              <a:buFont typeface="Arial" pitchFamily="34" charset="0"/>
+              <a:buChar char="▪"/>
+              <a:defRPr sz="1400" kern="1200">
+                <a:solidFill>
+                  <a:schemeClr val="tx1"/>
+                </a:solidFill>
+                <a:latin typeface="+mn-lt"/>
+                <a:ea typeface="+mn-ea"/>
+                <a:cs typeface="+mn-cs"/>
+              </a:defRPr>
+            </a:lvl6pPr>
+            <a:lvl7pPr marL="1600200" indent="-179388" algn="l" defTabSz="914400" rtl="0" eaLnBrk="1" latinLnBrk="0" hangingPunct="1">
+              <a:lnSpc>
+                <a:spcPct val="90000"/>
+              </a:lnSpc>
+              <a:spcBef>
+                <a:spcPts val="600"/>
+              </a:spcBef>
+              <a:buClr>
+                <a:schemeClr val="accent1">
+                  <a:lumMod val="75000"/>
+                </a:schemeClr>
+              </a:buClr>
+              <a:buSzPct val="100000"/>
+              <a:buFont typeface="Arial" pitchFamily="34" charset="0"/>
+              <a:buChar char="▪"/>
+              <a:defRPr sz="1400" kern="1200">
+                <a:solidFill>
+                  <a:schemeClr val="tx1"/>
+                </a:solidFill>
+                <a:latin typeface="+mn-lt"/>
+                <a:ea typeface="+mn-ea"/>
+                <a:cs typeface="+mn-cs"/>
+              </a:defRPr>
+            </a:lvl7pPr>
+            <a:lvl8pPr marL="1828800" indent="-182880" algn="l" defTabSz="914400" rtl="0" eaLnBrk="1" latinLnBrk="0" hangingPunct="1">
+              <a:lnSpc>
+                <a:spcPct val="90000"/>
+              </a:lnSpc>
+              <a:spcBef>
+                <a:spcPts val="600"/>
+              </a:spcBef>
+              <a:buClr>
+                <a:schemeClr val="accent1">
+                  <a:lumMod val="75000"/>
+                </a:schemeClr>
+              </a:buClr>
+              <a:buSzPct val="100000"/>
+              <a:buFont typeface="Arial" pitchFamily="34" charset="0"/>
+              <a:buChar char="▪"/>
+              <a:defRPr sz="1400" kern="1200">
+                <a:solidFill>
+                  <a:schemeClr val="tx1"/>
+                </a:solidFill>
+                <a:latin typeface="+mn-lt"/>
+                <a:ea typeface="+mn-ea"/>
+                <a:cs typeface="+mn-cs"/>
+              </a:defRPr>
+            </a:lvl8pPr>
+            <a:lvl9pPr marL="1878012" indent="0" algn="l" defTabSz="914400" rtl="0" eaLnBrk="1" latinLnBrk="0" hangingPunct="1">
+              <a:lnSpc>
+                <a:spcPct val="90000"/>
+              </a:lnSpc>
+              <a:spcBef>
+                <a:spcPts val="600"/>
+              </a:spcBef>
+              <a:buClr>
+                <a:schemeClr val="accent1">
+                  <a:lumMod val="75000"/>
+                </a:schemeClr>
+              </a:buClr>
+              <a:buSzPct val="100000"/>
+              <a:buFont typeface="Arial" pitchFamily="34" charset="0"/>
+              <a:buNone/>
+              <a:defRPr sz="1400" kern="1200">
+                <a:solidFill>
+                  <a:schemeClr val="tx1"/>
+                </a:solidFill>
+                <a:latin typeface="+mn-lt"/>
+                <a:ea typeface="+mn-ea"/>
+                <a:cs typeface="+mn-cs"/>
+              </a:defRPr>
+            </a:lvl9pPr>
+          </a:lstStyle>
+          <a:p>
+            <a:pPr algn="just">
+              <a:lnSpc>
+                <a:spcPct val="150000"/>
+              </a:lnSpc>
+              <a:buFont typeface="Arial" panose="020B0604020202020204" pitchFamily="34" charset="0"/>
+              <a:buChar char="•"/>
+            </a:pPr>
+            <a:r>
+              <a:rPr lang="en-US" sz="1400" dirty="0"/>
+              <a:t>Introducing a finite queue capacity makes queues fill up faster, deviating from the idealized theoretical model but reflecting real systems.</a:t>
+            </a:r>
+          </a:p>
+          <a:p>
+            <a:pPr algn="just">
+              <a:lnSpc>
+                <a:spcPct val="150000"/>
+              </a:lnSpc>
+              <a:buFont typeface="Arial" panose="020B0604020202020204" pitchFamily="34" charset="0"/>
+              <a:buChar char="•"/>
+            </a:pPr>
+            <a:endParaRPr lang="en-US" sz="1400" dirty="0"/>
+          </a:p>
+          <a:p>
+            <a:pPr algn="just">
+              <a:lnSpc>
+                <a:spcPct val="150000"/>
+              </a:lnSpc>
+              <a:buFont typeface="Arial" panose="020B0604020202020204" pitchFamily="34" charset="0"/>
+              <a:buChar char="•"/>
+            </a:pPr>
+            <a:r>
+              <a:rPr lang="en-US" sz="1400" dirty="0"/>
+              <a:t>Even with limited queue capacity, the supermarket method has a strong impact: queue lengths are significantly reduced already for d = 2.</a:t>
+            </a:r>
+          </a:p>
+          <a:p>
+            <a:pPr algn="just">
+              <a:lnSpc>
+                <a:spcPct val="150000"/>
+              </a:lnSpc>
+              <a:buFont typeface="Arial" panose="020B0604020202020204" pitchFamily="34" charset="0"/>
+              <a:buChar char="•"/>
+            </a:pPr>
+            <a:endParaRPr lang="en-US" sz="1400" dirty="0"/>
+          </a:p>
+          <a:p>
+            <a:pPr algn="just">
+              <a:lnSpc>
+                <a:spcPct val="150000"/>
+              </a:lnSpc>
+              <a:buFont typeface="Arial" panose="020B0604020202020204" pitchFamily="34" charset="0"/>
+              <a:buChar char="•"/>
+            </a:pPr>
+            <a:r>
+              <a:rPr lang="en-US" sz="1400" dirty="0"/>
+              <a:t>Adding a retry mechanism increases the load on the system, but drastically reduces the job drop rate.</a:t>
+            </a:r>
+          </a:p>
+          <a:p>
+            <a:pPr algn="just">
+              <a:lnSpc>
+                <a:spcPct val="150000"/>
+              </a:lnSpc>
+              <a:buFont typeface="Arial" panose="020B0604020202020204" pitchFamily="34" charset="0"/>
+              <a:buChar char="•"/>
+            </a:pPr>
+            <a:endParaRPr lang="en-US" sz="1400" dirty="0"/>
+          </a:p>
+          <a:p>
+            <a:pPr algn="just">
+              <a:lnSpc>
+                <a:spcPct val="150000"/>
+              </a:lnSpc>
+              <a:buFont typeface="Arial" panose="020B0604020202020204" pitchFamily="34" charset="0"/>
+              <a:buChar char="•"/>
+            </a:pPr>
+            <a:r>
+              <a:rPr lang="en-US" sz="1400" dirty="0"/>
+              <a:t>Overall, combining finite queue capacity and retry with the supermarket model results in a realistic system with very good performance under high load.</a:t>
+            </a:r>
+          </a:p>
+        </p:txBody>
+      </p:sp>
+    </p:spTree>
+    <p:extLst>
+      <p:ext uri="{BB962C8B-B14F-4D97-AF65-F5344CB8AC3E}">
+        <p14:creationId xmlns:p14="http://schemas.microsoft.com/office/powerpoint/2010/main" val="2798383465"/>
+      </p:ext>
+    </p:extLst>
+  </p:cSld>
+  <p:clrMapOvr>
+    <a:masterClrMapping/>
+  </p:clrMapOvr>
+  <mc:AlternateContent xmlns:mc="http://schemas.openxmlformats.org/markup-compatibility/2006" xmlns:p14="http://schemas.microsoft.com/office/powerpoint/2010/main">
+    <mc:Choice Requires="p14">
+      <p:transition spd="med" p14:dur="700">
+        <p:fade/>
+      </p:transition>
+    </mc:Choice>
+    <mc:Fallback xmlns="">
+      <p:transition spd="med">
+        <p:fade/>
+      </p:transition>
+    </mc:Fallback>
+  </mc:AlternateContent>
+</p:sld>
+</file>
+
+<file path=ppt/slides/slide17.xml><?xml version="1.0" encoding="utf-8"?>
+<p:sld xmlns:a="http://schemas.openxmlformats.org/drawingml/2006/main" xmlns:r="http://schemas.openxmlformats.org/officeDocument/2006/relationships" xmlns:p="http://schemas.openxmlformats.org/presentationml/2006/main">
+  <p:cSld>
+    <p:spTree>
+      <p:nvGrpSpPr>
+        <p:cNvPr id="1" name=""/>
+        <p:cNvGrpSpPr/>
+        <p:nvPr/>
+      </p:nvGrpSpPr>
+      <p:grpSpPr>
+        <a:xfrm>
+          <a:off x="0" y="0"/>
+          <a:ext cx="0" cy="0"/>
+          <a:chOff x="0" y="0"/>
+          <a:chExt cx="0" cy="0"/>
+        </a:xfrm>
+      </p:grpSpPr>
+      <p:sp>
+        <p:nvSpPr>
+          <p:cNvPr id="2" name="Title 1">
+            <a:extLst>
+              <a:ext uri="{FF2B5EF4-FFF2-40B4-BE49-F238E27FC236}">
+                <a16:creationId xmlns:a16="http://schemas.microsoft.com/office/drawing/2014/main" id="{240AD2AF-C1A1-46BD-B5CB-CE9E0E3DEAC3}"/>
+              </a:ext>
+            </a:extLst>
+          </p:cNvPr>
+          <p:cNvSpPr txBox="1">
+            <a:spLocks/>
+          </p:cNvSpPr>
+          <p:nvPr/>
+        </p:nvSpPr>
+        <p:spPr>
+          <a:xfrm>
+            <a:off x="589935" y="385867"/>
+            <a:ext cx="9601200" cy="931656"/>
+          </a:xfrm>
+          <a:prstGeom prst="rect">
+            <a:avLst/>
+          </a:prstGeom>
+        </p:spPr>
+        <p:txBody>
+          <a:bodyPr/>
+          <a:lstStyle>
+            <a:lvl1pPr algn="l" defTabSz="914400" rtl="0" eaLnBrk="1" latinLnBrk="0" hangingPunct="1">
+              <a:lnSpc>
+                <a:spcPct val="90000"/>
+              </a:lnSpc>
+              <a:spcBef>
+                <a:spcPct val="0"/>
+              </a:spcBef>
+              <a:buNone/>
+              <a:defRPr sz="3200" b="1" kern="1200">
+                <a:solidFill>
+                  <a:schemeClr val="accent1">
+                    <a:lumMod val="75000"/>
+                  </a:schemeClr>
+                </a:solidFill>
+                <a:latin typeface="+mj-lt"/>
+                <a:ea typeface="+mj-ea"/>
+                <a:cs typeface="+mj-cs"/>
+              </a:defRPr>
+            </a:lvl1pPr>
+          </a:lstStyle>
+          <a:p>
+            <a:r>
+              <a:rPr lang="en-US" dirty="0"/>
+              <a:t>Use of External Resources </a:t>
+            </a:r>
+            <a:endParaRPr lang="fa-IR" dirty="0"/>
+          </a:p>
+        </p:txBody>
+      </p:sp>
+      <p:sp>
+        <p:nvSpPr>
+          <p:cNvPr id="3" name="Content Placeholder 2">
+            <a:extLst>
+              <a:ext uri="{FF2B5EF4-FFF2-40B4-BE49-F238E27FC236}">
+                <a16:creationId xmlns:a16="http://schemas.microsoft.com/office/drawing/2014/main" id="{7E2D68DB-C6EC-511A-43E7-470B4E6F46A0}"/>
+              </a:ext>
+            </a:extLst>
+          </p:cNvPr>
+          <p:cNvSpPr txBox="1">
+            <a:spLocks/>
+          </p:cNvSpPr>
+          <p:nvPr/>
+        </p:nvSpPr>
+        <p:spPr>
+          <a:xfrm>
+            <a:off x="589935" y="1634613"/>
+            <a:ext cx="11012130" cy="4414683"/>
+          </a:xfrm>
+          <a:prstGeom prst="rect">
+            <a:avLst/>
+          </a:prstGeom>
+        </p:spPr>
+        <p:txBody>
+          <a:bodyPr>
+            <a:noAutofit/>
+          </a:bodyPr>
+          <a:lstStyle>
+            <a:lvl1pPr marL="228600" indent="-228600" algn="l" defTabSz="914400" rtl="0" eaLnBrk="1" latinLnBrk="0" hangingPunct="1">
+              <a:lnSpc>
+                <a:spcPct val="90000"/>
+              </a:lnSpc>
+              <a:spcBef>
+                <a:spcPts val="1800"/>
+              </a:spcBef>
+              <a:buClr>
+                <a:schemeClr val="accent1">
+                  <a:lumMod val="75000"/>
+                </a:schemeClr>
+              </a:buClr>
+              <a:buSzPct val="100000"/>
+              <a:buFont typeface="Arial" pitchFamily="34" charset="0"/>
+              <a:buChar char="▪"/>
+              <a:defRPr sz="2000" kern="1200">
+                <a:solidFill>
+                  <a:schemeClr val="tx1"/>
+                </a:solidFill>
+                <a:latin typeface="+mn-lt"/>
+                <a:ea typeface="+mn-ea"/>
+                <a:cs typeface="+mn-cs"/>
+              </a:defRPr>
+            </a:lvl1pPr>
+            <a:lvl2pPr marL="457200" indent="-182880" algn="l" defTabSz="914400" rtl="0" eaLnBrk="1" latinLnBrk="0" hangingPunct="1">
+              <a:lnSpc>
+                <a:spcPct val="90000"/>
+              </a:lnSpc>
+              <a:spcBef>
+                <a:spcPts val="1200"/>
+              </a:spcBef>
+              <a:buClr>
+                <a:schemeClr val="accent1">
+                  <a:lumMod val="75000"/>
+                </a:schemeClr>
+              </a:buClr>
+              <a:buSzPct val="100000"/>
+              <a:buFont typeface="Arial" pitchFamily="34" charset="0"/>
+              <a:buChar char="▪"/>
+              <a:defRPr sz="1800" kern="1200">
+                <a:solidFill>
+                  <a:schemeClr val="tx1"/>
+                </a:solidFill>
+                <a:latin typeface="+mn-lt"/>
+                <a:ea typeface="+mn-ea"/>
+                <a:cs typeface="+mn-cs"/>
+              </a:defRPr>
+            </a:lvl2pPr>
+            <a:lvl3pPr marL="685800" indent="-179388" algn="l" defTabSz="914400" rtl="0" eaLnBrk="1" latinLnBrk="0" hangingPunct="1">
+              <a:lnSpc>
+                <a:spcPct val="90000"/>
+              </a:lnSpc>
+              <a:spcBef>
+                <a:spcPts val="800"/>
+              </a:spcBef>
+              <a:buClr>
+                <a:schemeClr val="accent1">
+                  <a:lumMod val="75000"/>
+                </a:schemeClr>
+              </a:buClr>
+              <a:buSzPct val="100000"/>
+              <a:buFont typeface="Arial" pitchFamily="34" charset="0"/>
+              <a:buChar char="▪"/>
+              <a:defRPr sz="1600" kern="1200">
+                <a:solidFill>
+                  <a:schemeClr val="tx1"/>
+                </a:solidFill>
+                <a:latin typeface="+mn-lt"/>
+                <a:ea typeface="+mn-ea"/>
+                <a:cs typeface="+mn-cs"/>
+              </a:defRPr>
+            </a:lvl3pPr>
+            <a:lvl4pPr marL="914400" indent="-182880" algn="l" defTabSz="914400" rtl="0" eaLnBrk="1" latinLnBrk="0" hangingPunct="1">
+              <a:lnSpc>
+                <a:spcPct val="90000"/>
+              </a:lnSpc>
+              <a:spcBef>
+                <a:spcPts val="800"/>
+              </a:spcBef>
+              <a:buClr>
+                <a:schemeClr val="accent1">
+                  <a:lumMod val="75000"/>
+                </a:schemeClr>
+              </a:buClr>
+              <a:buSzPct val="100000"/>
+              <a:buFont typeface="Arial" pitchFamily="34" charset="0"/>
+              <a:buChar char="▪"/>
+              <a:defRPr sz="1400" kern="1200">
+                <a:solidFill>
+                  <a:schemeClr val="tx1"/>
+                </a:solidFill>
+                <a:latin typeface="+mn-lt"/>
+                <a:ea typeface="+mn-ea"/>
+                <a:cs typeface="+mn-cs"/>
+              </a:defRPr>
+            </a:lvl4pPr>
+            <a:lvl5pPr marL="1143000" indent="-179388" algn="l" defTabSz="914400" rtl="0" eaLnBrk="1" latinLnBrk="0" hangingPunct="1">
+              <a:lnSpc>
+                <a:spcPct val="90000"/>
+              </a:lnSpc>
+              <a:spcBef>
+                <a:spcPts val="600"/>
+              </a:spcBef>
+              <a:buClr>
+                <a:schemeClr val="accent1">
+                  <a:lumMod val="75000"/>
+                </a:schemeClr>
+              </a:buClr>
+              <a:buSzPct val="100000"/>
+              <a:buFont typeface="Arial" pitchFamily="34" charset="0"/>
+              <a:buChar char="▪"/>
+              <a:defRPr sz="1400" kern="1200">
+                <a:solidFill>
+                  <a:schemeClr val="tx1"/>
+                </a:solidFill>
+                <a:latin typeface="+mn-lt"/>
+                <a:ea typeface="+mn-ea"/>
+                <a:cs typeface="+mn-cs"/>
+              </a:defRPr>
+            </a:lvl5pPr>
+            <a:lvl6pPr marL="1371600" indent="-182880" algn="l" defTabSz="914400" rtl="0" eaLnBrk="1" latinLnBrk="0" hangingPunct="1">
+              <a:lnSpc>
+                <a:spcPct val="90000"/>
+              </a:lnSpc>
+              <a:spcBef>
+                <a:spcPts val="600"/>
+              </a:spcBef>
+              <a:buClr>
+                <a:schemeClr val="accent1">
+                  <a:lumMod val="75000"/>
+                </a:schemeClr>
+              </a:buClr>
+              <a:buSzPct val="100000"/>
+              <a:buFont typeface="Arial" pitchFamily="34" charset="0"/>
+              <a:buChar char="▪"/>
+              <a:defRPr sz="1400" kern="1200">
+                <a:solidFill>
+                  <a:schemeClr val="tx1"/>
+                </a:solidFill>
+                <a:latin typeface="+mn-lt"/>
+                <a:ea typeface="+mn-ea"/>
+                <a:cs typeface="+mn-cs"/>
+              </a:defRPr>
+            </a:lvl6pPr>
+            <a:lvl7pPr marL="1600200" indent="-179388" algn="l" defTabSz="914400" rtl="0" eaLnBrk="1" latinLnBrk="0" hangingPunct="1">
+              <a:lnSpc>
+                <a:spcPct val="90000"/>
+              </a:lnSpc>
+              <a:spcBef>
+                <a:spcPts val="600"/>
+              </a:spcBef>
+              <a:buClr>
+                <a:schemeClr val="accent1">
+                  <a:lumMod val="75000"/>
+                </a:schemeClr>
+              </a:buClr>
+              <a:buSzPct val="100000"/>
+              <a:buFont typeface="Arial" pitchFamily="34" charset="0"/>
+              <a:buChar char="▪"/>
+              <a:defRPr sz="1400" kern="1200">
+                <a:solidFill>
+                  <a:schemeClr val="tx1"/>
+                </a:solidFill>
+                <a:latin typeface="+mn-lt"/>
+                <a:ea typeface="+mn-ea"/>
+                <a:cs typeface="+mn-cs"/>
+              </a:defRPr>
+            </a:lvl7pPr>
+            <a:lvl8pPr marL="1828800" indent="-182880" algn="l" defTabSz="914400" rtl="0" eaLnBrk="1" latinLnBrk="0" hangingPunct="1">
+              <a:lnSpc>
+                <a:spcPct val="90000"/>
+              </a:lnSpc>
+              <a:spcBef>
+                <a:spcPts val="600"/>
+              </a:spcBef>
+              <a:buClr>
+                <a:schemeClr val="accent1">
+                  <a:lumMod val="75000"/>
+                </a:schemeClr>
+              </a:buClr>
+              <a:buSzPct val="100000"/>
+              <a:buFont typeface="Arial" pitchFamily="34" charset="0"/>
+              <a:buChar char="▪"/>
+              <a:defRPr sz="1400" kern="1200">
+                <a:solidFill>
+                  <a:schemeClr val="tx1"/>
+                </a:solidFill>
+                <a:latin typeface="+mn-lt"/>
+                <a:ea typeface="+mn-ea"/>
+                <a:cs typeface="+mn-cs"/>
+              </a:defRPr>
+            </a:lvl8pPr>
+            <a:lvl9pPr marL="1878012" indent="0" algn="l" defTabSz="914400" rtl="0" eaLnBrk="1" latinLnBrk="0" hangingPunct="1">
+              <a:lnSpc>
+                <a:spcPct val="90000"/>
+              </a:lnSpc>
+              <a:spcBef>
+                <a:spcPts val="600"/>
+              </a:spcBef>
+              <a:buClr>
+                <a:schemeClr val="accent1">
+                  <a:lumMod val="75000"/>
+                </a:schemeClr>
+              </a:buClr>
+              <a:buSzPct val="100000"/>
+              <a:buFont typeface="Arial" pitchFamily="34" charset="0"/>
+              <a:buNone/>
+              <a:defRPr sz="1400" kern="1200">
+                <a:solidFill>
+                  <a:schemeClr val="tx1"/>
+                </a:solidFill>
+                <a:latin typeface="+mn-lt"/>
+                <a:ea typeface="+mn-ea"/>
+                <a:cs typeface="+mn-cs"/>
+              </a:defRPr>
+            </a:lvl9pPr>
+          </a:lstStyle>
+          <a:p>
+            <a:pPr algn="just">
+              <a:lnSpc>
+                <a:spcPct val="150000"/>
+              </a:lnSpc>
+              <a:buFont typeface="Wingdings" panose="05000000000000000000" pitchFamily="2" charset="2"/>
+              <a:buChar char="§"/>
+            </a:pPr>
+            <a:r>
+              <a:rPr lang="en-US" sz="1400" dirty="0"/>
+              <a:t>This assignment was completed individually.</a:t>
+            </a:r>
+          </a:p>
+          <a:p>
+            <a:pPr algn="just">
+              <a:lnSpc>
+                <a:spcPct val="150000"/>
+              </a:lnSpc>
+              <a:buFont typeface="Wingdings" panose="05000000000000000000" pitchFamily="2" charset="2"/>
+              <a:buChar char="§"/>
+            </a:pPr>
+            <a:r>
+              <a:rPr lang="en-US" sz="1400" dirty="0"/>
+              <a:t>Large language models (ChatGPT) were extensively used as a support and learning tool, both to understand how the provided.</a:t>
+            </a:r>
+          </a:p>
+          <a:p>
+            <a:pPr algn="just">
+              <a:lnSpc>
+                <a:spcPct val="150000"/>
+              </a:lnSpc>
+              <a:buFont typeface="Wingdings" panose="05000000000000000000" pitchFamily="2" charset="2"/>
+              <a:buChar char="§"/>
+            </a:pPr>
+            <a:r>
+              <a:rPr lang="en-US" sz="1400" dirty="0"/>
+              <a:t>simulator code works and to assist in the implementation of the assignment, including writing and modifying parts of the code.</a:t>
+            </a:r>
+          </a:p>
+          <a:p>
+            <a:pPr algn="just">
+              <a:lnSpc>
+                <a:spcPct val="150000"/>
+              </a:lnSpc>
+              <a:buFont typeface="Wingdings" panose="05000000000000000000" pitchFamily="2" charset="2"/>
+              <a:buChar char="§"/>
+            </a:pPr>
+            <a:r>
+              <a:rPr lang="en-US" sz="1400" dirty="0"/>
+              <a:t>ChatGPT was also used to help with Python syntax, code structuring, and implementation ideas, due to limited prior experience with Python.</a:t>
+            </a:r>
+          </a:p>
+          <a:p>
+            <a:pPr algn="just">
+              <a:lnSpc>
+                <a:spcPct val="150000"/>
+              </a:lnSpc>
+              <a:buFont typeface="Wingdings" panose="05000000000000000000" pitchFamily="2" charset="2"/>
+              <a:buChar char="§"/>
+            </a:pPr>
+            <a:r>
+              <a:rPr lang="en-US" sz="1400" dirty="0"/>
+              <a:t>In addition, ChatGPT was used to support the writing of the report, helping with structure, clarity, and grammatical correctness.</a:t>
+            </a:r>
+          </a:p>
+          <a:p>
+            <a:pPr algn="just">
+              <a:lnSpc>
+                <a:spcPct val="150000"/>
+              </a:lnSpc>
+              <a:buFont typeface="Wingdings" panose="05000000000000000000" pitchFamily="2" charset="2"/>
+              <a:buChar char="§"/>
+            </a:pPr>
+            <a:r>
+              <a:rPr lang="en-US" sz="1400" dirty="0"/>
+              <a:t>Gemini was occasionally used to clarify specific theoretical concepts.</a:t>
+            </a:r>
+          </a:p>
+          <a:p>
+            <a:pPr algn="just">
+              <a:lnSpc>
+                <a:spcPct val="150000"/>
+              </a:lnSpc>
+              <a:buFont typeface="Wingdings" panose="05000000000000000000" pitchFamily="2" charset="2"/>
+              <a:buChar char="§"/>
+            </a:pPr>
+            <a:r>
+              <a:rPr lang="en-US" sz="1400" dirty="0"/>
+              <a:t>All design decisions, simulator modifications and experimental setups were independently carried out by the author.</a:t>
+            </a:r>
+          </a:p>
+        </p:txBody>
+      </p:sp>
+    </p:spTree>
+    <p:extLst>
+      <p:ext uri="{BB962C8B-B14F-4D97-AF65-F5344CB8AC3E}">
+        <p14:creationId xmlns:p14="http://schemas.microsoft.com/office/powerpoint/2010/main" val="375780580"/>
+      </p:ext>
+    </p:extLst>
+  </p:cSld>
+  <p:clrMapOvr>
+    <a:masterClrMapping/>
+  </p:clrMapOvr>
+  <mc:AlternateContent xmlns:mc="http://schemas.openxmlformats.org/markup-compatibility/2006" xmlns:p14="http://schemas.microsoft.com/office/powerpoint/2010/main">
+    <mc:Choice Requires="p14">
+      <p:transition spd="med" p14:dur="700">
+        <p:fade/>
+      </p:transition>
+    </mc:Choice>
+    <mc:Fallback xmlns="">
+      <p:transition spd="med">
+        <p:fade/>
+      </p:transition>
+    </mc:Fallback>
+  </mc:AlternateContent>
+</p:sld>
+</file>
+
+<file path=ppt/slides/slide18.xml><?xml version="1.0" encoding="utf-8"?>
+<p:sld xmlns:a="http://schemas.openxmlformats.org/drawingml/2006/main" xmlns:r="http://schemas.openxmlformats.org/officeDocument/2006/relationships" xmlns:p="http://schemas.openxmlformats.org/presentationml/2006/main">
+  <p:cSld>
+    <p:spTree>
+      <p:nvGrpSpPr>
+        <p:cNvPr id="1" name=""/>
+        <p:cNvGrpSpPr/>
+        <p:nvPr/>
+      </p:nvGrpSpPr>
+      <p:grpSpPr>
+        <a:xfrm>
+          <a:off x="0" y="0"/>
+          <a:ext cx="0" cy="0"/>
+          <a:chOff x="0" y="0"/>
+          <a:chExt cx="0" cy="0"/>
+        </a:xfrm>
+      </p:grpSpPr>
+      <p:sp>
+        <p:nvSpPr>
+          <p:cNvPr id="2" name="Title 1">
+            <a:extLst>
+              <a:ext uri="{FF2B5EF4-FFF2-40B4-BE49-F238E27FC236}">
                 <a16:creationId xmlns:a16="http://schemas.microsoft.com/office/drawing/2014/main" id="{88C45F0C-14F2-96FD-DABF-A5C430566F52}"/>
               </a:ext>
             </a:extLst>
@@ -19403,7 +21631,7 @@
 </p:sld>
 </file>
 
-<file path=ppt/slides/slide17.xml><?xml version="1.0" encoding="utf-8"?>
+<file path=ppt/slides/slide19.xml><?xml version="1.0" encoding="utf-8"?>
 <p:sld xmlns:a="http://schemas.openxmlformats.org/drawingml/2006/main" xmlns:r="http://schemas.openxmlformats.org/officeDocument/2006/relationships" xmlns:p="http://schemas.openxmlformats.org/presentationml/2006/main">
   <p:cSld>
     <p:spTree>
@@ -19480,917 +21708,6 @@
     <p:extLst>
       <p:ext uri="{BB962C8B-B14F-4D97-AF65-F5344CB8AC3E}">
         <p14:creationId xmlns:p14="http://schemas.microsoft.com/office/powerpoint/2010/main" val="1617376223"/>
-      </p:ext>
-    </p:extLst>
-  </p:cSld>
-  <p:clrMapOvr>
-    <a:masterClrMapping/>
-  </p:clrMapOvr>
-  <mc:AlternateContent xmlns:mc="http://schemas.openxmlformats.org/markup-compatibility/2006" xmlns:p14="http://schemas.microsoft.com/office/powerpoint/2010/main">
-    <mc:Choice Requires="p14">
-      <p:transition spd="med" p14:dur="700">
-        <p:fade/>
-      </p:transition>
-    </mc:Choice>
-    <mc:Fallback xmlns="">
-      <p:transition spd="med">
-        <p:fade/>
-      </p:transition>
-    </mc:Fallback>
-  </mc:AlternateContent>
-</p:sld>
-</file>
-
-<file path=ppt/slides/slide18.xml><?xml version="1.0" encoding="utf-8"?>
-<p:sld xmlns:a="http://schemas.openxmlformats.org/drawingml/2006/main" xmlns:r="http://schemas.openxmlformats.org/officeDocument/2006/relationships" xmlns:p="http://schemas.openxmlformats.org/presentationml/2006/main">
-  <p:cSld>
-    <p:spTree>
-      <p:nvGrpSpPr>
-        <p:cNvPr id="1" name=""/>
-        <p:cNvGrpSpPr/>
-        <p:nvPr/>
-      </p:nvGrpSpPr>
-      <p:grpSpPr>
-        <a:xfrm>
-          <a:off x="0" y="0"/>
-          <a:ext cx="0" cy="0"/>
-          <a:chOff x="0" y="0"/>
-          <a:chExt cx="0" cy="0"/>
-        </a:xfrm>
-      </p:grpSpPr>
-      <p:sp>
-        <p:nvSpPr>
-          <p:cNvPr id="2" name="Title 1">
-            <a:extLst>
-              <a:ext uri="{FF2B5EF4-FFF2-40B4-BE49-F238E27FC236}">
-                <a16:creationId xmlns:a16="http://schemas.microsoft.com/office/drawing/2014/main" id="{615809C9-A903-13BD-7F03-B39AF6929CB2}"/>
-              </a:ext>
-            </a:extLst>
-          </p:cNvPr>
-          <p:cNvSpPr txBox="1">
-            <a:spLocks/>
-          </p:cNvSpPr>
-          <p:nvPr/>
-        </p:nvSpPr>
-        <p:spPr>
-          <a:xfrm>
-            <a:off x="609599" y="137628"/>
-            <a:ext cx="9581535" cy="983250"/>
-          </a:xfrm>
-          <a:prstGeom prst="rect">
-            <a:avLst/>
-          </a:prstGeom>
-        </p:spPr>
-        <p:txBody>
-          <a:bodyPr/>
-          <a:lstStyle>
-            <a:lvl1pPr algn="l" defTabSz="914400" rtl="0" eaLnBrk="1" latinLnBrk="0" hangingPunct="1">
-              <a:lnSpc>
-                <a:spcPct val="90000"/>
-              </a:lnSpc>
-              <a:spcBef>
-                <a:spcPct val="0"/>
-              </a:spcBef>
-              <a:buNone/>
-              <a:defRPr sz="3200" b="1" kern="1200">
-                <a:solidFill>
-                  <a:schemeClr val="accent1">
-                    <a:lumMod val="75000"/>
-                  </a:schemeClr>
-                </a:solidFill>
-                <a:latin typeface="+mj-lt"/>
-                <a:ea typeface="+mj-ea"/>
-                <a:cs typeface="+mj-cs"/>
-              </a:defRPr>
-            </a:lvl1pPr>
-          </a:lstStyle>
-          <a:p>
-            <a:pPr>
-              <a:lnSpc>
-                <a:spcPct val="150000"/>
-              </a:lnSpc>
-            </a:pPr>
-            <a:r>
-              <a:rPr lang="en-US" dirty="0"/>
-              <a:t>Files overview</a:t>
-            </a:r>
-          </a:p>
-          <a:p>
-            <a:endParaRPr lang="en-US" dirty="0"/>
-          </a:p>
-          <a:p>
-            <a:endParaRPr lang="fa-IR" dirty="0"/>
-          </a:p>
-        </p:txBody>
-      </p:sp>
-      <p:sp>
-        <p:nvSpPr>
-          <p:cNvPr id="3" name="Content Placeholder 2">
-            <a:extLst>
-              <a:ext uri="{FF2B5EF4-FFF2-40B4-BE49-F238E27FC236}">
-                <a16:creationId xmlns:a16="http://schemas.microsoft.com/office/drawing/2014/main" id="{6D57F891-89F8-4CB4-4AB0-5009CFE99E6C}"/>
-              </a:ext>
-            </a:extLst>
-          </p:cNvPr>
-          <p:cNvSpPr txBox="1">
-            <a:spLocks/>
-          </p:cNvSpPr>
-          <p:nvPr/>
-        </p:nvSpPr>
-        <p:spPr>
-          <a:xfrm>
-            <a:off x="5574891" y="1410954"/>
-            <a:ext cx="6027174" cy="5122607"/>
-          </a:xfrm>
-          <a:prstGeom prst="rect">
-            <a:avLst/>
-          </a:prstGeom>
-        </p:spPr>
-        <p:txBody>
-          <a:bodyPr>
-            <a:normAutofit/>
-          </a:bodyPr>
-          <a:lstStyle>
-            <a:lvl1pPr marL="228600" indent="-228600" algn="l" defTabSz="914400" rtl="0" eaLnBrk="1" latinLnBrk="0" hangingPunct="1">
-              <a:lnSpc>
-                <a:spcPct val="90000"/>
-              </a:lnSpc>
-              <a:spcBef>
-                <a:spcPts val="1800"/>
-              </a:spcBef>
-              <a:buClr>
-                <a:schemeClr val="accent1">
-                  <a:lumMod val="75000"/>
-                </a:schemeClr>
-              </a:buClr>
-              <a:buSzPct val="100000"/>
-              <a:buFont typeface="Arial" pitchFamily="34" charset="0"/>
-              <a:buChar char="▪"/>
-              <a:defRPr sz="2000" kern="1200">
-                <a:solidFill>
-                  <a:schemeClr val="tx1"/>
-                </a:solidFill>
-                <a:latin typeface="+mn-lt"/>
-                <a:ea typeface="+mn-ea"/>
-                <a:cs typeface="+mn-cs"/>
-              </a:defRPr>
-            </a:lvl1pPr>
-            <a:lvl2pPr marL="457200" indent="-182880" algn="l" defTabSz="914400" rtl="0" eaLnBrk="1" latinLnBrk="0" hangingPunct="1">
-              <a:lnSpc>
-                <a:spcPct val="90000"/>
-              </a:lnSpc>
-              <a:spcBef>
-                <a:spcPts val="1200"/>
-              </a:spcBef>
-              <a:buClr>
-                <a:schemeClr val="accent1">
-                  <a:lumMod val="75000"/>
-                </a:schemeClr>
-              </a:buClr>
-              <a:buSzPct val="100000"/>
-              <a:buFont typeface="Arial" pitchFamily="34" charset="0"/>
-              <a:buChar char="▪"/>
-              <a:defRPr sz="1800" kern="1200">
-                <a:solidFill>
-                  <a:schemeClr val="tx1"/>
-                </a:solidFill>
-                <a:latin typeface="+mn-lt"/>
-                <a:ea typeface="+mn-ea"/>
-                <a:cs typeface="+mn-cs"/>
-              </a:defRPr>
-            </a:lvl2pPr>
-            <a:lvl3pPr marL="685800" indent="-179388" algn="l" defTabSz="914400" rtl="0" eaLnBrk="1" latinLnBrk="0" hangingPunct="1">
-              <a:lnSpc>
-                <a:spcPct val="90000"/>
-              </a:lnSpc>
-              <a:spcBef>
-                <a:spcPts val="800"/>
-              </a:spcBef>
-              <a:buClr>
-                <a:schemeClr val="accent1">
-                  <a:lumMod val="75000"/>
-                </a:schemeClr>
-              </a:buClr>
-              <a:buSzPct val="100000"/>
-              <a:buFont typeface="Arial" pitchFamily="34" charset="0"/>
-              <a:buChar char="▪"/>
-              <a:defRPr sz="1600" kern="1200">
-                <a:solidFill>
-                  <a:schemeClr val="tx1"/>
-                </a:solidFill>
-                <a:latin typeface="+mn-lt"/>
-                <a:ea typeface="+mn-ea"/>
-                <a:cs typeface="+mn-cs"/>
-              </a:defRPr>
-            </a:lvl3pPr>
-            <a:lvl4pPr marL="914400" indent="-182880" algn="l" defTabSz="914400" rtl="0" eaLnBrk="1" latinLnBrk="0" hangingPunct="1">
-              <a:lnSpc>
-                <a:spcPct val="90000"/>
-              </a:lnSpc>
-              <a:spcBef>
-                <a:spcPts val="800"/>
-              </a:spcBef>
-              <a:buClr>
-                <a:schemeClr val="accent1">
-                  <a:lumMod val="75000"/>
-                </a:schemeClr>
-              </a:buClr>
-              <a:buSzPct val="100000"/>
-              <a:buFont typeface="Arial" pitchFamily="34" charset="0"/>
-              <a:buChar char="▪"/>
-              <a:defRPr sz="1400" kern="1200">
-                <a:solidFill>
-                  <a:schemeClr val="tx1"/>
-                </a:solidFill>
-                <a:latin typeface="+mn-lt"/>
-                <a:ea typeface="+mn-ea"/>
-                <a:cs typeface="+mn-cs"/>
-              </a:defRPr>
-            </a:lvl4pPr>
-            <a:lvl5pPr marL="1143000" indent="-179388" algn="l" defTabSz="914400" rtl="0" eaLnBrk="1" latinLnBrk="0" hangingPunct="1">
-              <a:lnSpc>
-                <a:spcPct val="90000"/>
-              </a:lnSpc>
-              <a:spcBef>
-                <a:spcPts val="600"/>
-              </a:spcBef>
-              <a:buClr>
-                <a:schemeClr val="accent1">
-                  <a:lumMod val="75000"/>
-                </a:schemeClr>
-              </a:buClr>
-              <a:buSzPct val="100000"/>
-              <a:buFont typeface="Arial" pitchFamily="34" charset="0"/>
-              <a:buChar char="▪"/>
-              <a:defRPr sz="1400" kern="1200">
-                <a:solidFill>
-                  <a:schemeClr val="tx1"/>
-                </a:solidFill>
-                <a:latin typeface="+mn-lt"/>
-                <a:ea typeface="+mn-ea"/>
-                <a:cs typeface="+mn-cs"/>
-              </a:defRPr>
-            </a:lvl5pPr>
-            <a:lvl6pPr marL="1371600" indent="-182880" algn="l" defTabSz="914400" rtl="0" eaLnBrk="1" latinLnBrk="0" hangingPunct="1">
-              <a:lnSpc>
-                <a:spcPct val="90000"/>
-              </a:lnSpc>
-              <a:spcBef>
-                <a:spcPts val="600"/>
-              </a:spcBef>
-              <a:buClr>
-                <a:schemeClr val="accent1">
-                  <a:lumMod val="75000"/>
-                </a:schemeClr>
-              </a:buClr>
-              <a:buSzPct val="100000"/>
-              <a:buFont typeface="Arial" pitchFamily="34" charset="0"/>
-              <a:buChar char="▪"/>
-              <a:defRPr sz="1400" kern="1200">
-                <a:solidFill>
-                  <a:schemeClr val="tx1"/>
-                </a:solidFill>
-                <a:latin typeface="+mn-lt"/>
-                <a:ea typeface="+mn-ea"/>
-                <a:cs typeface="+mn-cs"/>
-              </a:defRPr>
-            </a:lvl6pPr>
-            <a:lvl7pPr marL="1600200" indent="-179388" algn="l" defTabSz="914400" rtl="0" eaLnBrk="1" latinLnBrk="0" hangingPunct="1">
-              <a:lnSpc>
-                <a:spcPct val="90000"/>
-              </a:lnSpc>
-              <a:spcBef>
-                <a:spcPts val="600"/>
-              </a:spcBef>
-              <a:buClr>
-                <a:schemeClr val="accent1">
-                  <a:lumMod val="75000"/>
-                </a:schemeClr>
-              </a:buClr>
-              <a:buSzPct val="100000"/>
-              <a:buFont typeface="Arial" pitchFamily="34" charset="0"/>
-              <a:buChar char="▪"/>
-              <a:defRPr sz="1400" kern="1200">
-                <a:solidFill>
-                  <a:schemeClr val="tx1"/>
-                </a:solidFill>
-                <a:latin typeface="+mn-lt"/>
-                <a:ea typeface="+mn-ea"/>
-                <a:cs typeface="+mn-cs"/>
-              </a:defRPr>
-            </a:lvl7pPr>
-            <a:lvl8pPr marL="1828800" indent="-182880" algn="l" defTabSz="914400" rtl="0" eaLnBrk="1" latinLnBrk="0" hangingPunct="1">
-              <a:lnSpc>
-                <a:spcPct val="90000"/>
-              </a:lnSpc>
-              <a:spcBef>
-                <a:spcPts val="600"/>
-              </a:spcBef>
-              <a:buClr>
-                <a:schemeClr val="accent1">
-                  <a:lumMod val="75000"/>
-                </a:schemeClr>
-              </a:buClr>
-              <a:buSzPct val="100000"/>
-              <a:buFont typeface="Arial" pitchFamily="34" charset="0"/>
-              <a:buChar char="▪"/>
-              <a:defRPr sz="1400" kern="1200">
-                <a:solidFill>
-                  <a:schemeClr val="tx1"/>
-                </a:solidFill>
-                <a:latin typeface="+mn-lt"/>
-                <a:ea typeface="+mn-ea"/>
-                <a:cs typeface="+mn-cs"/>
-              </a:defRPr>
-            </a:lvl8pPr>
-            <a:lvl9pPr marL="1878012" indent="0" algn="l" defTabSz="914400" rtl="0" eaLnBrk="1" latinLnBrk="0" hangingPunct="1">
-              <a:lnSpc>
-                <a:spcPct val="90000"/>
-              </a:lnSpc>
-              <a:spcBef>
-                <a:spcPts val="600"/>
-              </a:spcBef>
-              <a:buClr>
-                <a:schemeClr val="accent1">
-                  <a:lumMod val="75000"/>
-                </a:schemeClr>
-              </a:buClr>
-              <a:buSzPct val="100000"/>
-              <a:buFont typeface="Arial" pitchFamily="34" charset="0"/>
-              <a:buNone/>
-              <a:defRPr sz="1400" kern="1200">
-                <a:solidFill>
-                  <a:schemeClr val="tx1"/>
-                </a:solidFill>
-                <a:latin typeface="+mn-lt"/>
-                <a:ea typeface="+mn-ea"/>
-                <a:cs typeface="+mn-cs"/>
-              </a:defRPr>
-            </a:lvl9pPr>
-          </a:lstStyle>
-          <a:p>
-            <a:pPr marL="0" indent="0" algn="just">
-              <a:lnSpc>
-                <a:spcPct val="120000"/>
-              </a:lnSpc>
-              <a:buNone/>
-            </a:pPr>
-            <a:r>
-              <a:rPr lang="en-US" sz="1200" dirty="0"/>
-              <a:t>A quick look of the functionality of each file:</a:t>
-            </a:r>
-          </a:p>
-          <a:p>
-            <a:pPr algn="just">
-              <a:lnSpc>
-                <a:spcPct val="120000"/>
-              </a:lnSpc>
-            </a:pPr>
-            <a:r>
-              <a:rPr lang="en-US" sz="1200" dirty="0"/>
-              <a:t>discrete_event_sim.py: core discrete-event simulation engine (event queue and simulation time)</a:t>
-            </a:r>
-          </a:p>
-          <a:p>
-            <a:pPr algn="just">
-              <a:lnSpc>
-                <a:spcPct val="120000"/>
-              </a:lnSpc>
-            </a:pPr>
-            <a:r>
-              <a:rPr lang="en-US" sz="1200" dirty="0"/>
-              <a:t>queue_sim.py: implementation of the supermarket queueing model and simulation logic</a:t>
-            </a:r>
-          </a:p>
-          <a:p>
-            <a:pPr algn="just">
-              <a:lnSpc>
-                <a:spcPct val="120000"/>
-              </a:lnSpc>
-            </a:pPr>
-            <a:r>
-              <a:rPr lang="en-US" sz="1200" dirty="0"/>
-              <a:t>workloads.py: workload generators, including Weibull-distributed arrivals and service times</a:t>
-            </a:r>
-            <a:endParaRPr lang="fa-IR" sz="1200" dirty="0"/>
-          </a:p>
-          <a:p>
-            <a:pPr algn="just">
-              <a:lnSpc>
-                <a:spcPct val="120000"/>
-              </a:lnSpc>
-            </a:pPr>
-            <a:r>
-              <a:rPr lang="en-US" sz="1200" dirty="0"/>
-              <a:t>supermarket_plot.py: comparison between experimental and theoretical queue length distributions</a:t>
-            </a:r>
-          </a:p>
-          <a:p>
-            <a:pPr algn="just">
-              <a:lnSpc>
-                <a:spcPct val="120000"/>
-              </a:lnSpc>
-            </a:pPr>
-            <a:r>
-              <a:rPr lang="en-US" sz="1200" dirty="0"/>
-              <a:t>plot_queue_w.py: visualization of average system time (W) under different configurations</a:t>
-            </a:r>
-          </a:p>
-          <a:p>
-            <a:pPr algn="just">
-              <a:lnSpc>
-                <a:spcPct val="120000"/>
-              </a:lnSpc>
-            </a:pPr>
-            <a:r>
-              <a:rPr lang="en-US" sz="1200" dirty="0"/>
-              <a:t>run_dc.ps1: automation script for running multiple experiments(using PowerShell)</a:t>
-            </a:r>
-          </a:p>
-          <a:p>
-            <a:pPr marL="0" indent="0" algn="just">
-              <a:lnSpc>
-                <a:spcPct val="120000"/>
-              </a:lnSpc>
-              <a:buNone/>
-            </a:pPr>
-            <a:r>
-              <a:rPr lang="en-US" sz="1100" dirty="0"/>
-              <a:t>Additionally, files such as d1.json, d2.json, d5.json, etc. are automatically generated while running the script. These files store the experimentally observed queue length distributions and are used to analyze and validate the simulation results.</a:t>
-            </a:r>
-          </a:p>
-          <a:p>
-            <a:pPr algn="just">
-              <a:lnSpc>
-                <a:spcPct val="120000"/>
-              </a:lnSpc>
-            </a:pPr>
-            <a:endParaRPr lang="en-US" sz="1200" dirty="0"/>
-          </a:p>
-          <a:p>
-            <a:pPr algn="just">
-              <a:lnSpc>
-                <a:spcPct val="120000"/>
-              </a:lnSpc>
-            </a:pPr>
-            <a:endParaRPr lang="en-US" sz="1200" dirty="0"/>
-          </a:p>
-        </p:txBody>
-      </p:sp>
-      <p:pic>
-        <p:nvPicPr>
-          <p:cNvPr id="4" name="Picture 3">
-            <a:extLst>
-              <a:ext uri="{FF2B5EF4-FFF2-40B4-BE49-F238E27FC236}">
-                <a16:creationId xmlns:a16="http://schemas.microsoft.com/office/drawing/2014/main" id="{4341EC65-D57A-F78E-E915-6C538F452132}"/>
-              </a:ext>
-            </a:extLst>
-          </p:cNvPr>
-          <p:cNvPicPr>
-            <a:picLocks noChangeAspect="1"/>
-          </p:cNvPicPr>
-          <p:nvPr/>
-        </p:nvPicPr>
-        <p:blipFill>
-          <a:blip r:embed="rId2"/>
-          <a:stretch>
-            <a:fillRect/>
-          </a:stretch>
-        </p:blipFill>
-        <p:spPr>
-          <a:xfrm>
-            <a:off x="528485" y="2109021"/>
-            <a:ext cx="4178540" cy="3726475"/>
-          </a:xfrm>
-          <a:prstGeom prst="rect">
-            <a:avLst/>
-          </a:prstGeom>
-        </p:spPr>
-      </p:pic>
-    </p:spTree>
-    <p:extLst>
-      <p:ext uri="{BB962C8B-B14F-4D97-AF65-F5344CB8AC3E}">
-        <p14:creationId xmlns:p14="http://schemas.microsoft.com/office/powerpoint/2010/main" val="1526797457"/>
-      </p:ext>
-    </p:extLst>
-  </p:cSld>
-  <p:clrMapOvr>
-    <a:masterClrMapping/>
-  </p:clrMapOvr>
-  <mc:AlternateContent xmlns:mc="http://schemas.openxmlformats.org/markup-compatibility/2006" xmlns:p14="http://schemas.microsoft.com/office/powerpoint/2010/main">
-    <mc:Choice Requires="p14">
-      <p:transition spd="med" p14:dur="700">
-        <p:fade/>
-      </p:transition>
-    </mc:Choice>
-    <mc:Fallback xmlns="">
-      <p:transition spd="med">
-        <p:fade/>
-      </p:transition>
-    </mc:Fallback>
-  </mc:AlternateContent>
-</p:sld>
-</file>
-
-<file path=ppt/slides/slide19.xml><?xml version="1.0" encoding="utf-8"?>
-<p:sld xmlns:a="http://schemas.openxmlformats.org/drawingml/2006/main" xmlns:r="http://schemas.openxmlformats.org/officeDocument/2006/relationships" xmlns:p="http://schemas.openxmlformats.org/presentationml/2006/main">
-  <p:cSld>
-    <p:spTree>
-      <p:nvGrpSpPr>
-        <p:cNvPr id="1" name=""/>
-        <p:cNvGrpSpPr/>
-        <p:nvPr/>
-      </p:nvGrpSpPr>
-      <p:grpSpPr>
-        <a:xfrm>
-          <a:off x="0" y="0"/>
-          <a:ext cx="0" cy="0"/>
-          <a:chOff x="0" y="0"/>
-          <a:chExt cx="0" cy="0"/>
-        </a:xfrm>
-      </p:grpSpPr>
-      <p:sp>
-        <p:nvSpPr>
-          <p:cNvPr id="4" name="Content Placeholder 2">
-            <a:extLst>
-              <a:ext uri="{FF2B5EF4-FFF2-40B4-BE49-F238E27FC236}">
-                <a16:creationId xmlns:a16="http://schemas.microsoft.com/office/drawing/2014/main" id="{B654F57B-9F01-BB76-26A1-2CA565760251}"/>
-              </a:ext>
-            </a:extLst>
-          </p:cNvPr>
-          <p:cNvSpPr txBox="1">
-            <a:spLocks/>
-          </p:cNvSpPr>
-          <p:nvPr/>
-        </p:nvSpPr>
-        <p:spPr>
-          <a:xfrm>
-            <a:off x="589935" y="1978792"/>
-            <a:ext cx="10579511" cy="4345858"/>
-          </a:xfrm>
-          <a:prstGeom prst="rect">
-            <a:avLst/>
-          </a:prstGeom>
-        </p:spPr>
-        <p:txBody>
-          <a:bodyPr>
-            <a:normAutofit/>
-          </a:bodyPr>
-          <a:lstStyle>
-            <a:lvl1pPr marL="228600" indent="-228600" algn="l" defTabSz="914400" rtl="0" eaLnBrk="1" latinLnBrk="0" hangingPunct="1">
-              <a:lnSpc>
-                <a:spcPct val="90000"/>
-              </a:lnSpc>
-              <a:spcBef>
-                <a:spcPts val="1800"/>
-              </a:spcBef>
-              <a:buClr>
-                <a:schemeClr val="accent1">
-                  <a:lumMod val="75000"/>
-                </a:schemeClr>
-              </a:buClr>
-              <a:buSzPct val="100000"/>
-              <a:buFont typeface="Arial" pitchFamily="34" charset="0"/>
-              <a:buChar char="▪"/>
-              <a:defRPr sz="2000" kern="1200">
-                <a:solidFill>
-                  <a:schemeClr val="tx1"/>
-                </a:solidFill>
-                <a:latin typeface="+mn-lt"/>
-                <a:ea typeface="+mn-ea"/>
-                <a:cs typeface="+mn-cs"/>
-              </a:defRPr>
-            </a:lvl1pPr>
-            <a:lvl2pPr marL="457200" indent="-182880" algn="l" defTabSz="914400" rtl="0" eaLnBrk="1" latinLnBrk="0" hangingPunct="1">
-              <a:lnSpc>
-                <a:spcPct val="90000"/>
-              </a:lnSpc>
-              <a:spcBef>
-                <a:spcPts val="1200"/>
-              </a:spcBef>
-              <a:buClr>
-                <a:schemeClr val="accent1">
-                  <a:lumMod val="75000"/>
-                </a:schemeClr>
-              </a:buClr>
-              <a:buSzPct val="100000"/>
-              <a:buFont typeface="Arial" pitchFamily="34" charset="0"/>
-              <a:buChar char="▪"/>
-              <a:defRPr sz="1800" kern="1200">
-                <a:solidFill>
-                  <a:schemeClr val="tx1"/>
-                </a:solidFill>
-                <a:latin typeface="+mn-lt"/>
-                <a:ea typeface="+mn-ea"/>
-                <a:cs typeface="+mn-cs"/>
-              </a:defRPr>
-            </a:lvl2pPr>
-            <a:lvl3pPr marL="685800" indent="-179388" algn="l" defTabSz="914400" rtl="0" eaLnBrk="1" latinLnBrk="0" hangingPunct="1">
-              <a:lnSpc>
-                <a:spcPct val="90000"/>
-              </a:lnSpc>
-              <a:spcBef>
-                <a:spcPts val="800"/>
-              </a:spcBef>
-              <a:buClr>
-                <a:schemeClr val="accent1">
-                  <a:lumMod val="75000"/>
-                </a:schemeClr>
-              </a:buClr>
-              <a:buSzPct val="100000"/>
-              <a:buFont typeface="Arial" pitchFamily="34" charset="0"/>
-              <a:buChar char="▪"/>
-              <a:defRPr sz="1600" kern="1200">
-                <a:solidFill>
-                  <a:schemeClr val="tx1"/>
-                </a:solidFill>
-                <a:latin typeface="+mn-lt"/>
-                <a:ea typeface="+mn-ea"/>
-                <a:cs typeface="+mn-cs"/>
-              </a:defRPr>
-            </a:lvl3pPr>
-            <a:lvl4pPr marL="914400" indent="-182880" algn="l" defTabSz="914400" rtl="0" eaLnBrk="1" latinLnBrk="0" hangingPunct="1">
-              <a:lnSpc>
-                <a:spcPct val="90000"/>
-              </a:lnSpc>
-              <a:spcBef>
-                <a:spcPts val="800"/>
-              </a:spcBef>
-              <a:buClr>
-                <a:schemeClr val="accent1">
-                  <a:lumMod val="75000"/>
-                </a:schemeClr>
-              </a:buClr>
-              <a:buSzPct val="100000"/>
-              <a:buFont typeface="Arial" pitchFamily="34" charset="0"/>
-              <a:buChar char="▪"/>
-              <a:defRPr sz="1400" kern="1200">
-                <a:solidFill>
-                  <a:schemeClr val="tx1"/>
-                </a:solidFill>
-                <a:latin typeface="+mn-lt"/>
-                <a:ea typeface="+mn-ea"/>
-                <a:cs typeface="+mn-cs"/>
-              </a:defRPr>
-            </a:lvl4pPr>
-            <a:lvl5pPr marL="1143000" indent="-179388" algn="l" defTabSz="914400" rtl="0" eaLnBrk="1" latinLnBrk="0" hangingPunct="1">
-              <a:lnSpc>
-                <a:spcPct val="90000"/>
-              </a:lnSpc>
-              <a:spcBef>
-                <a:spcPts val="600"/>
-              </a:spcBef>
-              <a:buClr>
-                <a:schemeClr val="accent1">
-                  <a:lumMod val="75000"/>
-                </a:schemeClr>
-              </a:buClr>
-              <a:buSzPct val="100000"/>
-              <a:buFont typeface="Arial" pitchFamily="34" charset="0"/>
-              <a:buChar char="▪"/>
-              <a:defRPr sz="1400" kern="1200">
-                <a:solidFill>
-                  <a:schemeClr val="tx1"/>
-                </a:solidFill>
-                <a:latin typeface="+mn-lt"/>
-                <a:ea typeface="+mn-ea"/>
-                <a:cs typeface="+mn-cs"/>
-              </a:defRPr>
-            </a:lvl5pPr>
-            <a:lvl6pPr marL="1371600" indent="-182880" algn="l" defTabSz="914400" rtl="0" eaLnBrk="1" latinLnBrk="0" hangingPunct="1">
-              <a:lnSpc>
-                <a:spcPct val="90000"/>
-              </a:lnSpc>
-              <a:spcBef>
-                <a:spcPts val="600"/>
-              </a:spcBef>
-              <a:buClr>
-                <a:schemeClr val="accent1">
-                  <a:lumMod val="75000"/>
-                </a:schemeClr>
-              </a:buClr>
-              <a:buSzPct val="100000"/>
-              <a:buFont typeface="Arial" pitchFamily="34" charset="0"/>
-              <a:buChar char="▪"/>
-              <a:defRPr sz="1400" kern="1200">
-                <a:solidFill>
-                  <a:schemeClr val="tx1"/>
-                </a:solidFill>
-                <a:latin typeface="+mn-lt"/>
-                <a:ea typeface="+mn-ea"/>
-                <a:cs typeface="+mn-cs"/>
-              </a:defRPr>
-            </a:lvl6pPr>
-            <a:lvl7pPr marL="1600200" indent="-179388" algn="l" defTabSz="914400" rtl="0" eaLnBrk="1" latinLnBrk="0" hangingPunct="1">
-              <a:lnSpc>
-                <a:spcPct val="90000"/>
-              </a:lnSpc>
-              <a:spcBef>
-                <a:spcPts val="600"/>
-              </a:spcBef>
-              <a:buClr>
-                <a:schemeClr val="accent1">
-                  <a:lumMod val="75000"/>
-                </a:schemeClr>
-              </a:buClr>
-              <a:buSzPct val="100000"/>
-              <a:buFont typeface="Arial" pitchFamily="34" charset="0"/>
-              <a:buChar char="▪"/>
-              <a:defRPr sz="1400" kern="1200">
-                <a:solidFill>
-                  <a:schemeClr val="tx1"/>
-                </a:solidFill>
-                <a:latin typeface="+mn-lt"/>
-                <a:ea typeface="+mn-ea"/>
-                <a:cs typeface="+mn-cs"/>
-              </a:defRPr>
-            </a:lvl7pPr>
-            <a:lvl8pPr marL="1828800" indent="-182880" algn="l" defTabSz="914400" rtl="0" eaLnBrk="1" latinLnBrk="0" hangingPunct="1">
-              <a:lnSpc>
-                <a:spcPct val="90000"/>
-              </a:lnSpc>
-              <a:spcBef>
-                <a:spcPts val="600"/>
-              </a:spcBef>
-              <a:buClr>
-                <a:schemeClr val="accent1">
-                  <a:lumMod val="75000"/>
-                </a:schemeClr>
-              </a:buClr>
-              <a:buSzPct val="100000"/>
-              <a:buFont typeface="Arial" pitchFamily="34" charset="0"/>
-              <a:buChar char="▪"/>
-              <a:defRPr sz="1400" kern="1200">
-                <a:solidFill>
-                  <a:schemeClr val="tx1"/>
-                </a:solidFill>
-                <a:latin typeface="+mn-lt"/>
-                <a:ea typeface="+mn-ea"/>
-                <a:cs typeface="+mn-cs"/>
-              </a:defRPr>
-            </a:lvl8pPr>
-            <a:lvl9pPr marL="1878012" indent="0" algn="l" defTabSz="914400" rtl="0" eaLnBrk="1" latinLnBrk="0" hangingPunct="1">
-              <a:lnSpc>
-                <a:spcPct val="90000"/>
-              </a:lnSpc>
-              <a:spcBef>
-                <a:spcPts val="600"/>
-              </a:spcBef>
-              <a:buClr>
-                <a:schemeClr val="accent1">
-                  <a:lumMod val="75000"/>
-                </a:schemeClr>
-              </a:buClr>
-              <a:buSzPct val="100000"/>
-              <a:buFont typeface="Arial" pitchFamily="34" charset="0"/>
-              <a:buNone/>
-              <a:defRPr sz="1400" kern="1200">
-                <a:solidFill>
-                  <a:schemeClr val="tx1"/>
-                </a:solidFill>
-                <a:latin typeface="+mn-lt"/>
-                <a:ea typeface="+mn-ea"/>
-                <a:cs typeface="+mn-cs"/>
-              </a:defRPr>
-            </a:lvl9pPr>
-          </a:lstStyle>
-          <a:p>
-            <a:pPr algn="just">
-              <a:lnSpc>
-                <a:spcPct val="150000"/>
-              </a:lnSpc>
-            </a:pPr>
-            <a:r>
-              <a:rPr lang="en-US" sz="1400" dirty="0"/>
-              <a:t>The simulator is executed using a PowerShell script (run_dc.ps1), which requires the simulation parameters to be provided explicitly.</a:t>
-            </a:r>
-          </a:p>
-          <a:p>
-            <a:pPr algn="just">
-              <a:lnSpc>
-                <a:spcPct val="150000"/>
-              </a:lnSpc>
-            </a:pPr>
-            <a:r>
-              <a:rPr lang="en-US" sz="1400" dirty="0"/>
-              <a:t>A typical execution command is:</a:t>
-            </a:r>
-          </a:p>
-          <a:p>
-            <a:pPr marL="0" indent="0" algn="just">
-              <a:lnSpc>
-                <a:spcPct val="150000"/>
-              </a:lnSpc>
-              <a:buNone/>
-            </a:pPr>
-            <a:endParaRPr lang="en-US" sz="1400" dirty="0"/>
-          </a:p>
-          <a:p>
-            <a:pPr algn="just">
-              <a:lnSpc>
-                <a:spcPct val="150000"/>
-              </a:lnSpc>
-            </a:pPr>
-            <a:r>
-              <a:rPr lang="en-US" sz="1400" dirty="0"/>
-              <a:t>The script runs the simulator with the specified parameters, executes multiple experiments with different values of d (1, 2, 5, 8, 10), and automatically generates output files containing the experimental results and after that, the corresponding plots comparing experimental and theoretical results are displayed automatically.</a:t>
-            </a:r>
-          </a:p>
-        </p:txBody>
-      </p:sp>
-      <p:sp>
-        <p:nvSpPr>
-          <p:cNvPr id="5" name="Title 1">
-            <a:extLst>
-              <a:ext uri="{FF2B5EF4-FFF2-40B4-BE49-F238E27FC236}">
-                <a16:creationId xmlns:a16="http://schemas.microsoft.com/office/drawing/2014/main" id="{CE7A8D64-4915-F4BD-27D8-A3699096ECC5}"/>
-              </a:ext>
-            </a:extLst>
-          </p:cNvPr>
-          <p:cNvSpPr txBox="1">
-            <a:spLocks/>
-          </p:cNvSpPr>
-          <p:nvPr/>
-        </p:nvSpPr>
-        <p:spPr>
-          <a:xfrm>
-            <a:off x="589935" y="230522"/>
-            <a:ext cx="9601200" cy="1142385"/>
-          </a:xfrm>
-          <a:prstGeom prst="rect">
-            <a:avLst/>
-          </a:prstGeom>
-        </p:spPr>
-        <p:txBody>
-          <a:bodyPr/>
-          <a:lstStyle>
-            <a:lvl1pPr algn="l" defTabSz="914400" rtl="0" eaLnBrk="1" latinLnBrk="0" hangingPunct="1">
-              <a:lnSpc>
-                <a:spcPct val="90000"/>
-              </a:lnSpc>
-              <a:spcBef>
-                <a:spcPct val="0"/>
-              </a:spcBef>
-              <a:buNone/>
-              <a:defRPr sz="3200" b="1" kern="1200">
-                <a:solidFill>
-                  <a:schemeClr val="accent1">
-                    <a:lumMod val="75000"/>
-                  </a:schemeClr>
-                </a:solidFill>
-                <a:latin typeface="+mj-lt"/>
-                <a:ea typeface="+mj-ea"/>
-                <a:cs typeface="+mj-cs"/>
-              </a:defRPr>
-            </a:lvl1pPr>
-          </a:lstStyle>
-          <a:p>
-            <a:pPr>
-              <a:lnSpc>
-                <a:spcPct val="150000"/>
-              </a:lnSpc>
-            </a:pPr>
-            <a:r>
-              <a:rPr lang="en-US" dirty="0"/>
-              <a:t>run_dc.ps1 &amp; execution</a:t>
-            </a:r>
-          </a:p>
-        </p:txBody>
-      </p:sp>
-      <p:pic>
-        <p:nvPicPr>
-          <p:cNvPr id="18" name="Picture 17">
-            <a:extLst>
-              <a:ext uri="{FF2B5EF4-FFF2-40B4-BE49-F238E27FC236}">
-                <a16:creationId xmlns:a16="http://schemas.microsoft.com/office/drawing/2014/main" id="{96545710-9923-D886-C031-8436BCD98176}"/>
-              </a:ext>
-            </a:extLst>
-          </p:cNvPr>
-          <p:cNvPicPr>
-            <a:picLocks noChangeAspect="1"/>
-          </p:cNvPicPr>
-          <p:nvPr/>
-        </p:nvPicPr>
-        <p:blipFill>
-          <a:blip r:embed="rId2"/>
-          <a:stretch>
-            <a:fillRect/>
-          </a:stretch>
-        </p:blipFill>
-        <p:spPr>
-          <a:xfrm>
-            <a:off x="889687" y="3387212"/>
-            <a:ext cx="5353797" cy="257211"/>
-          </a:xfrm>
-          <a:prstGeom prst="rect">
-            <a:avLst/>
-          </a:prstGeom>
-        </p:spPr>
-      </p:pic>
-    </p:spTree>
-    <p:extLst>
-      <p:ext uri="{BB962C8B-B14F-4D97-AF65-F5344CB8AC3E}">
-        <p14:creationId xmlns:p14="http://schemas.microsoft.com/office/powerpoint/2010/main" val="3230294370"/>
       </p:ext>
     </p:extLst>
   </p:cSld>
@@ -20587,6 +21904,917 @@
           <p:cNvPr id="2" name="Title 1">
             <a:extLst>
               <a:ext uri="{FF2B5EF4-FFF2-40B4-BE49-F238E27FC236}">
+                <a16:creationId xmlns:a16="http://schemas.microsoft.com/office/drawing/2014/main" id="{615809C9-A903-13BD-7F03-B39AF6929CB2}"/>
+              </a:ext>
+            </a:extLst>
+          </p:cNvPr>
+          <p:cNvSpPr txBox="1">
+            <a:spLocks/>
+          </p:cNvSpPr>
+          <p:nvPr/>
+        </p:nvSpPr>
+        <p:spPr>
+          <a:xfrm>
+            <a:off x="609599" y="137628"/>
+            <a:ext cx="9581535" cy="983250"/>
+          </a:xfrm>
+          <a:prstGeom prst="rect">
+            <a:avLst/>
+          </a:prstGeom>
+        </p:spPr>
+        <p:txBody>
+          <a:bodyPr/>
+          <a:lstStyle>
+            <a:lvl1pPr algn="l" defTabSz="914400" rtl="0" eaLnBrk="1" latinLnBrk="0" hangingPunct="1">
+              <a:lnSpc>
+                <a:spcPct val="90000"/>
+              </a:lnSpc>
+              <a:spcBef>
+                <a:spcPct val="0"/>
+              </a:spcBef>
+              <a:buNone/>
+              <a:defRPr sz="3200" b="1" kern="1200">
+                <a:solidFill>
+                  <a:schemeClr val="accent1">
+                    <a:lumMod val="75000"/>
+                  </a:schemeClr>
+                </a:solidFill>
+                <a:latin typeface="+mj-lt"/>
+                <a:ea typeface="+mj-ea"/>
+                <a:cs typeface="+mj-cs"/>
+              </a:defRPr>
+            </a:lvl1pPr>
+          </a:lstStyle>
+          <a:p>
+            <a:pPr>
+              <a:lnSpc>
+                <a:spcPct val="150000"/>
+              </a:lnSpc>
+            </a:pPr>
+            <a:r>
+              <a:rPr lang="en-US" dirty="0"/>
+              <a:t>Files overview</a:t>
+            </a:r>
+          </a:p>
+          <a:p>
+            <a:endParaRPr lang="en-US" dirty="0"/>
+          </a:p>
+          <a:p>
+            <a:endParaRPr lang="fa-IR" dirty="0"/>
+          </a:p>
+        </p:txBody>
+      </p:sp>
+      <p:sp>
+        <p:nvSpPr>
+          <p:cNvPr id="3" name="Content Placeholder 2">
+            <a:extLst>
+              <a:ext uri="{FF2B5EF4-FFF2-40B4-BE49-F238E27FC236}">
+                <a16:creationId xmlns:a16="http://schemas.microsoft.com/office/drawing/2014/main" id="{6D57F891-89F8-4CB4-4AB0-5009CFE99E6C}"/>
+              </a:ext>
+            </a:extLst>
+          </p:cNvPr>
+          <p:cNvSpPr txBox="1">
+            <a:spLocks/>
+          </p:cNvSpPr>
+          <p:nvPr/>
+        </p:nvSpPr>
+        <p:spPr>
+          <a:xfrm>
+            <a:off x="5574891" y="1410954"/>
+            <a:ext cx="6027174" cy="5122607"/>
+          </a:xfrm>
+          <a:prstGeom prst="rect">
+            <a:avLst/>
+          </a:prstGeom>
+        </p:spPr>
+        <p:txBody>
+          <a:bodyPr>
+            <a:normAutofit/>
+          </a:bodyPr>
+          <a:lstStyle>
+            <a:lvl1pPr marL="228600" indent="-228600" algn="l" defTabSz="914400" rtl="0" eaLnBrk="1" latinLnBrk="0" hangingPunct="1">
+              <a:lnSpc>
+                <a:spcPct val="90000"/>
+              </a:lnSpc>
+              <a:spcBef>
+                <a:spcPts val="1800"/>
+              </a:spcBef>
+              <a:buClr>
+                <a:schemeClr val="accent1">
+                  <a:lumMod val="75000"/>
+                </a:schemeClr>
+              </a:buClr>
+              <a:buSzPct val="100000"/>
+              <a:buFont typeface="Arial" pitchFamily="34" charset="0"/>
+              <a:buChar char="▪"/>
+              <a:defRPr sz="2000" kern="1200">
+                <a:solidFill>
+                  <a:schemeClr val="tx1"/>
+                </a:solidFill>
+                <a:latin typeface="+mn-lt"/>
+                <a:ea typeface="+mn-ea"/>
+                <a:cs typeface="+mn-cs"/>
+              </a:defRPr>
+            </a:lvl1pPr>
+            <a:lvl2pPr marL="457200" indent="-182880" algn="l" defTabSz="914400" rtl="0" eaLnBrk="1" latinLnBrk="0" hangingPunct="1">
+              <a:lnSpc>
+                <a:spcPct val="90000"/>
+              </a:lnSpc>
+              <a:spcBef>
+                <a:spcPts val="1200"/>
+              </a:spcBef>
+              <a:buClr>
+                <a:schemeClr val="accent1">
+                  <a:lumMod val="75000"/>
+                </a:schemeClr>
+              </a:buClr>
+              <a:buSzPct val="100000"/>
+              <a:buFont typeface="Arial" pitchFamily="34" charset="0"/>
+              <a:buChar char="▪"/>
+              <a:defRPr sz="1800" kern="1200">
+                <a:solidFill>
+                  <a:schemeClr val="tx1"/>
+                </a:solidFill>
+                <a:latin typeface="+mn-lt"/>
+                <a:ea typeface="+mn-ea"/>
+                <a:cs typeface="+mn-cs"/>
+              </a:defRPr>
+            </a:lvl2pPr>
+            <a:lvl3pPr marL="685800" indent="-179388" algn="l" defTabSz="914400" rtl="0" eaLnBrk="1" latinLnBrk="0" hangingPunct="1">
+              <a:lnSpc>
+                <a:spcPct val="90000"/>
+              </a:lnSpc>
+              <a:spcBef>
+                <a:spcPts val="800"/>
+              </a:spcBef>
+              <a:buClr>
+                <a:schemeClr val="accent1">
+                  <a:lumMod val="75000"/>
+                </a:schemeClr>
+              </a:buClr>
+              <a:buSzPct val="100000"/>
+              <a:buFont typeface="Arial" pitchFamily="34" charset="0"/>
+              <a:buChar char="▪"/>
+              <a:defRPr sz="1600" kern="1200">
+                <a:solidFill>
+                  <a:schemeClr val="tx1"/>
+                </a:solidFill>
+                <a:latin typeface="+mn-lt"/>
+                <a:ea typeface="+mn-ea"/>
+                <a:cs typeface="+mn-cs"/>
+              </a:defRPr>
+            </a:lvl3pPr>
+            <a:lvl4pPr marL="914400" indent="-182880" algn="l" defTabSz="914400" rtl="0" eaLnBrk="1" latinLnBrk="0" hangingPunct="1">
+              <a:lnSpc>
+                <a:spcPct val="90000"/>
+              </a:lnSpc>
+              <a:spcBef>
+                <a:spcPts val="800"/>
+              </a:spcBef>
+              <a:buClr>
+                <a:schemeClr val="accent1">
+                  <a:lumMod val="75000"/>
+                </a:schemeClr>
+              </a:buClr>
+              <a:buSzPct val="100000"/>
+              <a:buFont typeface="Arial" pitchFamily="34" charset="0"/>
+              <a:buChar char="▪"/>
+              <a:defRPr sz="1400" kern="1200">
+                <a:solidFill>
+                  <a:schemeClr val="tx1"/>
+                </a:solidFill>
+                <a:latin typeface="+mn-lt"/>
+                <a:ea typeface="+mn-ea"/>
+                <a:cs typeface="+mn-cs"/>
+              </a:defRPr>
+            </a:lvl4pPr>
+            <a:lvl5pPr marL="1143000" indent="-179388" algn="l" defTabSz="914400" rtl="0" eaLnBrk="1" latinLnBrk="0" hangingPunct="1">
+              <a:lnSpc>
+                <a:spcPct val="90000"/>
+              </a:lnSpc>
+              <a:spcBef>
+                <a:spcPts val="600"/>
+              </a:spcBef>
+              <a:buClr>
+                <a:schemeClr val="accent1">
+                  <a:lumMod val="75000"/>
+                </a:schemeClr>
+              </a:buClr>
+              <a:buSzPct val="100000"/>
+              <a:buFont typeface="Arial" pitchFamily="34" charset="0"/>
+              <a:buChar char="▪"/>
+              <a:defRPr sz="1400" kern="1200">
+                <a:solidFill>
+                  <a:schemeClr val="tx1"/>
+                </a:solidFill>
+                <a:latin typeface="+mn-lt"/>
+                <a:ea typeface="+mn-ea"/>
+                <a:cs typeface="+mn-cs"/>
+              </a:defRPr>
+            </a:lvl5pPr>
+            <a:lvl6pPr marL="1371600" indent="-182880" algn="l" defTabSz="914400" rtl="0" eaLnBrk="1" latinLnBrk="0" hangingPunct="1">
+              <a:lnSpc>
+                <a:spcPct val="90000"/>
+              </a:lnSpc>
+              <a:spcBef>
+                <a:spcPts val="600"/>
+              </a:spcBef>
+              <a:buClr>
+                <a:schemeClr val="accent1">
+                  <a:lumMod val="75000"/>
+                </a:schemeClr>
+              </a:buClr>
+              <a:buSzPct val="100000"/>
+              <a:buFont typeface="Arial" pitchFamily="34" charset="0"/>
+              <a:buChar char="▪"/>
+              <a:defRPr sz="1400" kern="1200">
+                <a:solidFill>
+                  <a:schemeClr val="tx1"/>
+                </a:solidFill>
+                <a:latin typeface="+mn-lt"/>
+                <a:ea typeface="+mn-ea"/>
+                <a:cs typeface="+mn-cs"/>
+              </a:defRPr>
+            </a:lvl6pPr>
+            <a:lvl7pPr marL="1600200" indent="-179388" algn="l" defTabSz="914400" rtl="0" eaLnBrk="1" latinLnBrk="0" hangingPunct="1">
+              <a:lnSpc>
+                <a:spcPct val="90000"/>
+              </a:lnSpc>
+              <a:spcBef>
+                <a:spcPts val="600"/>
+              </a:spcBef>
+              <a:buClr>
+                <a:schemeClr val="accent1">
+                  <a:lumMod val="75000"/>
+                </a:schemeClr>
+              </a:buClr>
+              <a:buSzPct val="100000"/>
+              <a:buFont typeface="Arial" pitchFamily="34" charset="0"/>
+              <a:buChar char="▪"/>
+              <a:defRPr sz="1400" kern="1200">
+                <a:solidFill>
+                  <a:schemeClr val="tx1"/>
+                </a:solidFill>
+                <a:latin typeface="+mn-lt"/>
+                <a:ea typeface="+mn-ea"/>
+                <a:cs typeface="+mn-cs"/>
+              </a:defRPr>
+            </a:lvl7pPr>
+            <a:lvl8pPr marL="1828800" indent="-182880" algn="l" defTabSz="914400" rtl="0" eaLnBrk="1" latinLnBrk="0" hangingPunct="1">
+              <a:lnSpc>
+                <a:spcPct val="90000"/>
+              </a:lnSpc>
+              <a:spcBef>
+                <a:spcPts val="600"/>
+              </a:spcBef>
+              <a:buClr>
+                <a:schemeClr val="accent1">
+                  <a:lumMod val="75000"/>
+                </a:schemeClr>
+              </a:buClr>
+              <a:buSzPct val="100000"/>
+              <a:buFont typeface="Arial" pitchFamily="34" charset="0"/>
+              <a:buChar char="▪"/>
+              <a:defRPr sz="1400" kern="1200">
+                <a:solidFill>
+                  <a:schemeClr val="tx1"/>
+                </a:solidFill>
+                <a:latin typeface="+mn-lt"/>
+                <a:ea typeface="+mn-ea"/>
+                <a:cs typeface="+mn-cs"/>
+              </a:defRPr>
+            </a:lvl8pPr>
+            <a:lvl9pPr marL="1878012" indent="0" algn="l" defTabSz="914400" rtl="0" eaLnBrk="1" latinLnBrk="0" hangingPunct="1">
+              <a:lnSpc>
+                <a:spcPct val="90000"/>
+              </a:lnSpc>
+              <a:spcBef>
+                <a:spcPts val="600"/>
+              </a:spcBef>
+              <a:buClr>
+                <a:schemeClr val="accent1">
+                  <a:lumMod val="75000"/>
+                </a:schemeClr>
+              </a:buClr>
+              <a:buSzPct val="100000"/>
+              <a:buFont typeface="Arial" pitchFamily="34" charset="0"/>
+              <a:buNone/>
+              <a:defRPr sz="1400" kern="1200">
+                <a:solidFill>
+                  <a:schemeClr val="tx1"/>
+                </a:solidFill>
+                <a:latin typeface="+mn-lt"/>
+                <a:ea typeface="+mn-ea"/>
+                <a:cs typeface="+mn-cs"/>
+              </a:defRPr>
+            </a:lvl9pPr>
+          </a:lstStyle>
+          <a:p>
+            <a:pPr marL="0" indent="0" algn="just">
+              <a:lnSpc>
+                <a:spcPct val="120000"/>
+              </a:lnSpc>
+              <a:buNone/>
+            </a:pPr>
+            <a:r>
+              <a:rPr lang="en-US" sz="1200" dirty="0"/>
+              <a:t>A quick look of the functionality of each file:</a:t>
+            </a:r>
+          </a:p>
+          <a:p>
+            <a:pPr algn="just">
+              <a:lnSpc>
+                <a:spcPct val="120000"/>
+              </a:lnSpc>
+            </a:pPr>
+            <a:r>
+              <a:rPr lang="en-US" sz="1200" dirty="0"/>
+              <a:t>discrete_event_sim.py: core discrete-event simulation engine (event queue and simulation time)</a:t>
+            </a:r>
+          </a:p>
+          <a:p>
+            <a:pPr algn="just">
+              <a:lnSpc>
+                <a:spcPct val="120000"/>
+              </a:lnSpc>
+            </a:pPr>
+            <a:r>
+              <a:rPr lang="en-US" sz="1200" dirty="0"/>
+              <a:t>queue_sim.py: implementation of the supermarket queueing model and simulation logic</a:t>
+            </a:r>
+          </a:p>
+          <a:p>
+            <a:pPr algn="just">
+              <a:lnSpc>
+                <a:spcPct val="120000"/>
+              </a:lnSpc>
+            </a:pPr>
+            <a:r>
+              <a:rPr lang="en-US" sz="1200" dirty="0"/>
+              <a:t>workloads.py: workload generators, including Weibull-distributed arrivals and service times</a:t>
+            </a:r>
+            <a:endParaRPr lang="fa-IR" sz="1200" dirty="0"/>
+          </a:p>
+          <a:p>
+            <a:pPr algn="just">
+              <a:lnSpc>
+                <a:spcPct val="120000"/>
+              </a:lnSpc>
+            </a:pPr>
+            <a:r>
+              <a:rPr lang="en-US" sz="1200" dirty="0"/>
+              <a:t>supermarket_plot.py: comparison between experimental and theoretical queue length distributions</a:t>
+            </a:r>
+          </a:p>
+          <a:p>
+            <a:pPr algn="just">
+              <a:lnSpc>
+                <a:spcPct val="120000"/>
+              </a:lnSpc>
+            </a:pPr>
+            <a:r>
+              <a:rPr lang="en-US" sz="1200" dirty="0"/>
+              <a:t>plot_queue_w.py: visualization of average system time (W) under different configurations</a:t>
+            </a:r>
+          </a:p>
+          <a:p>
+            <a:pPr algn="just">
+              <a:lnSpc>
+                <a:spcPct val="120000"/>
+              </a:lnSpc>
+            </a:pPr>
+            <a:r>
+              <a:rPr lang="en-US" sz="1200" dirty="0"/>
+              <a:t>run_dc.ps1: automation script for running multiple experiments(using PowerShell)</a:t>
+            </a:r>
+          </a:p>
+          <a:p>
+            <a:pPr marL="0" indent="0" algn="just">
+              <a:lnSpc>
+                <a:spcPct val="120000"/>
+              </a:lnSpc>
+              <a:buNone/>
+            </a:pPr>
+            <a:r>
+              <a:rPr lang="en-US" sz="1100" dirty="0"/>
+              <a:t>Additionally, files such as d1.json, d2.json, d5.json, etc. are automatically generated while running the script. These files store the experimentally observed queue length distributions and are used to analyze and validate the simulation results.</a:t>
+            </a:r>
+          </a:p>
+          <a:p>
+            <a:pPr algn="just">
+              <a:lnSpc>
+                <a:spcPct val="120000"/>
+              </a:lnSpc>
+            </a:pPr>
+            <a:endParaRPr lang="en-US" sz="1200" dirty="0"/>
+          </a:p>
+          <a:p>
+            <a:pPr algn="just">
+              <a:lnSpc>
+                <a:spcPct val="120000"/>
+              </a:lnSpc>
+            </a:pPr>
+            <a:endParaRPr lang="en-US" sz="1200" dirty="0"/>
+          </a:p>
+        </p:txBody>
+      </p:sp>
+      <p:pic>
+        <p:nvPicPr>
+          <p:cNvPr id="4" name="Picture 3">
+            <a:extLst>
+              <a:ext uri="{FF2B5EF4-FFF2-40B4-BE49-F238E27FC236}">
+                <a16:creationId xmlns:a16="http://schemas.microsoft.com/office/drawing/2014/main" id="{4341EC65-D57A-F78E-E915-6C538F452132}"/>
+              </a:ext>
+            </a:extLst>
+          </p:cNvPr>
+          <p:cNvPicPr>
+            <a:picLocks noChangeAspect="1"/>
+          </p:cNvPicPr>
+          <p:nvPr/>
+        </p:nvPicPr>
+        <p:blipFill>
+          <a:blip r:embed="rId2"/>
+          <a:stretch>
+            <a:fillRect/>
+          </a:stretch>
+        </p:blipFill>
+        <p:spPr>
+          <a:xfrm>
+            <a:off x="528485" y="2109021"/>
+            <a:ext cx="4178540" cy="3726475"/>
+          </a:xfrm>
+          <a:prstGeom prst="rect">
+            <a:avLst/>
+          </a:prstGeom>
+        </p:spPr>
+      </p:pic>
+    </p:spTree>
+    <p:extLst>
+      <p:ext uri="{BB962C8B-B14F-4D97-AF65-F5344CB8AC3E}">
+        <p14:creationId xmlns:p14="http://schemas.microsoft.com/office/powerpoint/2010/main" val="1526797457"/>
+      </p:ext>
+    </p:extLst>
+  </p:cSld>
+  <p:clrMapOvr>
+    <a:masterClrMapping/>
+  </p:clrMapOvr>
+  <mc:AlternateContent xmlns:mc="http://schemas.openxmlformats.org/markup-compatibility/2006" xmlns:p14="http://schemas.microsoft.com/office/powerpoint/2010/main">
+    <mc:Choice Requires="p14">
+      <p:transition spd="med" p14:dur="700">
+        <p:fade/>
+      </p:transition>
+    </mc:Choice>
+    <mc:Fallback xmlns="">
+      <p:transition spd="med">
+        <p:fade/>
+      </p:transition>
+    </mc:Fallback>
+  </mc:AlternateContent>
+</p:sld>
+</file>
+
+<file path=ppt/slides/slide21.xml><?xml version="1.0" encoding="utf-8"?>
+<p:sld xmlns:a="http://schemas.openxmlformats.org/drawingml/2006/main" xmlns:r="http://schemas.openxmlformats.org/officeDocument/2006/relationships" xmlns:p="http://schemas.openxmlformats.org/presentationml/2006/main">
+  <p:cSld>
+    <p:spTree>
+      <p:nvGrpSpPr>
+        <p:cNvPr id="1" name=""/>
+        <p:cNvGrpSpPr/>
+        <p:nvPr/>
+      </p:nvGrpSpPr>
+      <p:grpSpPr>
+        <a:xfrm>
+          <a:off x="0" y="0"/>
+          <a:ext cx="0" cy="0"/>
+          <a:chOff x="0" y="0"/>
+          <a:chExt cx="0" cy="0"/>
+        </a:xfrm>
+      </p:grpSpPr>
+      <p:sp>
+        <p:nvSpPr>
+          <p:cNvPr id="4" name="Content Placeholder 2">
+            <a:extLst>
+              <a:ext uri="{FF2B5EF4-FFF2-40B4-BE49-F238E27FC236}">
+                <a16:creationId xmlns:a16="http://schemas.microsoft.com/office/drawing/2014/main" id="{B654F57B-9F01-BB76-26A1-2CA565760251}"/>
+              </a:ext>
+            </a:extLst>
+          </p:cNvPr>
+          <p:cNvSpPr txBox="1">
+            <a:spLocks/>
+          </p:cNvSpPr>
+          <p:nvPr/>
+        </p:nvSpPr>
+        <p:spPr>
+          <a:xfrm>
+            <a:off x="589935" y="1978792"/>
+            <a:ext cx="10579511" cy="4345858"/>
+          </a:xfrm>
+          <a:prstGeom prst="rect">
+            <a:avLst/>
+          </a:prstGeom>
+        </p:spPr>
+        <p:txBody>
+          <a:bodyPr>
+            <a:normAutofit/>
+          </a:bodyPr>
+          <a:lstStyle>
+            <a:lvl1pPr marL="228600" indent="-228600" algn="l" defTabSz="914400" rtl="0" eaLnBrk="1" latinLnBrk="0" hangingPunct="1">
+              <a:lnSpc>
+                <a:spcPct val="90000"/>
+              </a:lnSpc>
+              <a:spcBef>
+                <a:spcPts val="1800"/>
+              </a:spcBef>
+              <a:buClr>
+                <a:schemeClr val="accent1">
+                  <a:lumMod val="75000"/>
+                </a:schemeClr>
+              </a:buClr>
+              <a:buSzPct val="100000"/>
+              <a:buFont typeface="Arial" pitchFamily="34" charset="0"/>
+              <a:buChar char="▪"/>
+              <a:defRPr sz="2000" kern="1200">
+                <a:solidFill>
+                  <a:schemeClr val="tx1"/>
+                </a:solidFill>
+                <a:latin typeface="+mn-lt"/>
+                <a:ea typeface="+mn-ea"/>
+                <a:cs typeface="+mn-cs"/>
+              </a:defRPr>
+            </a:lvl1pPr>
+            <a:lvl2pPr marL="457200" indent="-182880" algn="l" defTabSz="914400" rtl="0" eaLnBrk="1" latinLnBrk="0" hangingPunct="1">
+              <a:lnSpc>
+                <a:spcPct val="90000"/>
+              </a:lnSpc>
+              <a:spcBef>
+                <a:spcPts val="1200"/>
+              </a:spcBef>
+              <a:buClr>
+                <a:schemeClr val="accent1">
+                  <a:lumMod val="75000"/>
+                </a:schemeClr>
+              </a:buClr>
+              <a:buSzPct val="100000"/>
+              <a:buFont typeface="Arial" pitchFamily="34" charset="0"/>
+              <a:buChar char="▪"/>
+              <a:defRPr sz="1800" kern="1200">
+                <a:solidFill>
+                  <a:schemeClr val="tx1"/>
+                </a:solidFill>
+                <a:latin typeface="+mn-lt"/>
+                <a:ea typeface="+mn-ea"/>
+                <a:cs typeface="+mn-cs"/>
+              </a:defRPr>
+            </a:lvl2pPr>
+            <a:lvl3pPr marL="685800" indent="-179388" algn="l" defTabSz="914400" rtl="0" eaLnBrk="1" latinLnBrk="0" hangingPunct="1">
+              <a:lnSpc>
+                <a:spcPct val="90000"/>
+              </a:lnSpc>
+              <a:spcBef>
+                <a:spcPts val="800"/>
+              </a:spcBef>
+              <a:buClr>
+                <a:schemeClr val="accent1">
+                  <a:lumMod val="75000"/>
+                </a:schemeClr>
+              </a:buClr>
+              <a:buSzPct val="100000"/>
+              <a:buFont typeface="Arial" pitchFamily="34" charset="0"/>
+              <a:buChar char="▪"/>
+              <a:defRPr sz="1600" kern="1200">
+                <a:solidFill>
+                  <a:schemeClr val="tx1"/>
+                </a:solidFill>
+                <a:latin typeface="+mn-lt"/>
+                <a:ea typeface="+mn-ea"/>
+                <a:cs typeface="+mn-cs"/>
+              </a:defRPr>
+            </a:lvl3pPr>
+            <a:lvl4pPr marL="914400" indent="-182880" algn="l" defTabSz="914400" rtl="0" eaLnBrk="1" latinLnBrk="0" hangingPunct="1">
+              <a:lnSpc>
+                <a:spcPct val="90000"/>
+              </a:lnSpc>
+              <a:spcBef>
+                <a:spcPts val="800"/>
+              </a:spcBef>
+              <a:buClr>
+                <a:schemeClr val="accent1">
+                  <a:lumMod val="75000"/>
+                </a:schemeClr>
+              </a:buClr>
+              <a:buSzPct val="100000"/>
+              <a:buFont typeface="Arial" pitchFamily="34" charset="0"/>
+              <a:buChar char="▪"/>
+              <a:defRPr sz="1400" kern="1200">
+                <a:solidFill>
+                  <a:schemeClr val="tx1"/>
+                </a:solidFill>
+                <a:latin typeface="+mn-lt"/>
+                <a:ea typeface="+mn-ea"/>
+                <a:cs typeface="+mn-cs"/>
+              </a:defRPr>
+            </a:lvl4pPr>
+            <a:lvl5pPr marL="1143000" indent="-179388" algn="l" defTabSz="914400" rtl="0" eaLnBrk="1" latinLnBrk="0" hangingPunct="1">
+              <a:lnSpc>
+                <a:spcPct val="90000"/>
+              </a:lnSpc>
+              <a:spcBef>
+                <a:spcPts val="600"/>
+              </a:spcBef>
+              <a:buClr>
+                <a:schemeClr val="accent1">
+                  <a:lumMod val="75000"/>
+                </a:schemeClr>
+              </a:buClr>
+              <a:buSzPct val="100000"/>
+              <a:buFont typeface="Arial" pitchFamily="34" charset="0"/>
+              <a:buChar char="▪"/>
+              <a:defRPr sz="1400" kern="1200">
+                <a:solidFill>
+                  <a:schemeClr val="tx1"/>
+                </a:solidFill>
+                <a:latin typeface="+mn-lt"/>
+                <a:ea typeface="+mn-ea"/>
+                <a:cs typeface="+mn-cs"/>
+              </a:defRPr>
+            </a:lvl5pPr>
+            <a:lvl6pPr marL="1371600" indent="-182880" algn="l" defTabSz="914400" rtl="0" eaLnBrk="1" latinLnBrk="0" hangingPunct="1">
+              <a:lnSpc>
+                <a:spcPct val="90000"/>
+              </a:lnSpc>
+              <a:spcBef>
+                <a:spcPts val="600"/>
+              </a:spcBef>
+              <a:buClr>
+                <a:schemeClr val="accent1">
+                  <a:lumMod val="75000"/>
+                </a:schemeClr>
+              </a:buClr>
+              <a:buSzPct val="100000"/>
+              <a:buFont typeface="Arial" pitchFamily="34" charset="0"/>
+              <a:buChar char="▪"/>
+              <a:defRPr sz="1400" kern="1200">
+                <a:solidFill>
+                  <a:schemeClr val="tx1"/>
+                </a:solidFill>
+                <a:latin typeface="+mn-lt"/>
+                <a:ea typeface="+mn-ea"/>
+                <a:cs typeface="+mn-cs"/>
+              </a:defRPr>
+            </a:lvl6pPr>
+            <a:lvl7pPr marL="1600200" indent="-179388" algn="l" defTabSz="914400" rtl="0" eaLnBrk="1" latinLnBrk="0" hangingPunct="1">
+              <a:lnSpc>
+                <a:spcPct val="90000"/>
+              </a:lnSpc>
+              <a:spcBef>
+                <a:spcPts val="600"/>
+              </a:spcBef>
+              <a:buClr>
+                <a:schemeClr val="accent1">
+                  <a:lumMod val="75000"/>
+                </a:schemeClr>
+              </a:buClr>
+              <a:buSzPct val="100000"/>
+              <a:buFont typeface="Arial" pitchFamily="34" charset="0"/>
+              <a:buChar char="▪"/>
+              <a:defRPr sz="1400" kern="1200">
+                <a:solidFill>
+                  <a:schemeClr val="tx1"/>
+                </a:solidFill>
+                <a:latin typeface="+mn-lt"/>
+                <a:ea typeface="+mn-ea"/>
+                <a:cs typeface="+mn-cs"/>
+              </a:defRPr>
+            </a:lvl7pPr>
+            <a:lvl8pPr marL="1828800" indent="-182880" algn="l" defTabSz="914400" rtl="0" eaLnBrk="1" latinLnBrk="0" hangingPunct="1">
+              <a:lnSpc>
+                <a:spcPct val="90000"/>
+              </a:lnSpc>
+              <a:spcBef>
+                <a:spcPts val="600"/>
+              </a:spcBef>
+              <a:buClr>
+                <a:schemeClr val="accent1">
+                  <a:lumMod val="75000"/>
+                </a:schemeClr>
+              </a:buClr>
+              <a:buSzPct val="100000"/>
+              <a:buFont typeface="Arial" pitchFamily="34" charset="0"/>
+              <a:buChar char="▪"/>
+              <a:defRPr sz="1400" kern="1200">
+                <a:solidFill>
+                  <a:schemeClr val="tx1"/>
+                </a:solidFill>
+                <a:latin typeface="+mn-lt"/>
+                <a:ea typeface="+mn-ea"/>
+                <a:cs typeface="+mn-cs"/>
+              </a:defRPr>
+            </a:lvl8pPr>
+            <a:lvl9pPr marL="1878012" indent="0" algn="l" defTabSz="914400" rtl="0" eaLnBrk="1" latinLnBrk="0" hangingPunct="1">
+              <a:lnSpc>
+                <a:spcPct val="90000"/>
+              </a:lnSpc>
+              <a:spcBef>
+                <a:spcPts val="600"/>
+              </a:spcBef>
+              <a:buClr>
+                <a:schemeClr val="accent1">
+                  <a:lumMod val="75000"/>
+                </a:schemeClr>
+              </a:buClr>
+              <a:buSzPct val="100000"/>
+              <a:buFont typeface="Arial" pitchFamily="34" charset="0"/>
+              <a:buNone/>
+              <a:defRPr sz="1400" kern="1200">
+                <a:solidFill>
+                  <a:schemeClr val="tx1"/>
+                </a:solidFill>
+                <a:latin typeface="+mn-lt"/>
+                <a:ea typeface="+mn-ea"/>
+                <a:cs typeface="+mn-cs"/>
+              </a:defRPr>
+            </a:lvl9pPr>
+          </a:lstStyle>
+          <a:p>
+            <a:pPr algn="just">
+              <a:lnSpc>
+                <a:spcPct val="150000"/>
+              </a:lnSpc>
+            </a:pPr>
+            <a:r>
+              <a:rPr lang="en-US" sz="1400" dirty="0"/>
+              <a:t>The simulator is executed using a PowerShell script (run_dc.ps1), which requires the simulation parameters to be provided explicitly.</a:t>
+            </a:r>
+          </a:p>
+          <a:p>
+            <a:pPr algn="just">
+              <a:lnSpc>
+                <a:spcPct val="150000"/>
+              </a:lnSpc>
+            </a:pPr>
+            <a:r>
+              <a:rPr lang="en-US" sz="1400" dirty="0"/>
+              <a:t>A typical execution command is:</a:t>
+            </a:r>
+          </a:p>
+          <a:p>
+            <a:pPr marL="0" indent="0" algn="just">
+              <a:lnSpc>
+                <a:spcPct val="150000"/>
+              </a:lnSpc>
+              <a:buNone/>
+            </a:pPr>
+            <a:endParaRPr lang="en-US" sz="1400" dirty="0"/>
+          </a:p>
+          <a:p>
+            <a:pPr algn="just">
+              <a:lnSpc>
+                <a:spcPct val="150000"/>
+              </a:lnSpc>
+            </a:pPr>
+            <a:r>
+              <a:rPr lang="en-US" sz="1400" dirty="0"/>
+              <a:t>The script runs the simulator with the specified parameters, executes multiple experiments with different values of d (1, 2, 5, 8, 10), and automatically generates output files containing the experimental results and after that, the corresponding plots comparing experimental and theoretical results are displayed automatically.</a:t>
+            </a:r>
+          </a:p>
+        </p:txBody>
+      </p:sp>
+      <p:sp>
+        <p:nvSpPr>
+          <p:cNvPr id="5" name="Title 1">
+            <a:extLst>
+              <a:ext uri="{FF2B5EF4-FFF2-40B4-BE49-F238E27FC236}">
+                <a16:creationId xmlns:a16="http://schemas.microsoft.com/office/drawing/2014/main" id="{CE7A8D64-4915-F4BD-27D8-A3699096ECC5}"/>
+              </a:ext>
+            </a:extLst>
+          </p:cNvPr>
+          <p:cNvSpPr txBox="1">
+            <a:spLocks/>
+          </p:cNvSpPr>
+          <p:nvPr/>
+        </p:nvSpPr>
+        <p:spPr>
+          <a:xfrm>
+            <a:off x="589935" y="230522"/>
+            <a:ext cx="9601200" cy="1142385"/>
+          </a:xfrm>
+          <a:prstGeom prst="rect">
+            <a:avLst/>
+          </a:prstGeom>
+        </p:spPr>
+        <p:txBody>
+          <a:bodyPr/>
+          <a:lstStyle>
+            <a:lvl1pPr algn="l" defTabSz="914400" rtl="0" eaLnBrk="1" latinLnBrk="0" hangingPunct="1">
+              <a:lnSpc>
+                <a:spcPct val="90000"/>
+              </a:lnSpc>
+              <a:spcBef>
+                <a:spcPct val="0"/>
+              </a:spcBef>
+              <a:buNone/>
+              <a:defRPr sz="3200" b="1" kern="1200">
+                <a:solidFill>
+                  <a:schemeClr val="accent1">
+                    <a:lumMod val="75000"/>
+                  </a:schemeClr>
+                </a:solidFill>
+                <a:latin typeface="+mj-lt"/>
+                <a:ea typeface="+mj-ea"/>
+                <a:cs typeface="+mj-cs"/>
+              </a:defRPr>
+            </a:lvl1pPr>
+          </a:lstStyle>
+          <a:p>
+            <a:pPr>
+              <a:lnSpc>
+                <a:spcPct val="150000"/>
+              </a:lnSpc>
+            </a:pPr>
+            <a:r>
+              <a:rPr lang="en-US" dirty="0"/>
+              <a:t>run_dc.ps1 &amp; execution</a:t>
+            </a:r>
+          </a:p>
+        </p:txBody>
+      </p:sp>
+      <p:pic>
+        <p:nvPicPr>
+          <p:cNvPr id="18" name="Picture 17">
+            <a:extLst>
+              <a:ext uri="{FF2B5EF4-FFF2-40B4-BE49-F238E27FC236}">
+                <a16:creationId xmlns:a16="http://schemas.microsoft.com/office/drawing/2014/main" id="{96545710-9923-D886-C031-8436BCD98176}"/>
+              </a:ext>
+            </a:extLst>
+          </p:cNvPr>
+          <p:cNvPicPr>
+            <a:picLocks noChangeAspect="1"/>
+          </p:cNvPicPr>
+          <p:nvPr/>
+        </p:nvPicPr>
+        <p:blipFill>
+          <a:blip r:embed="rId2"/>
+          <a:stretch>
+            <a:fillRect/>
+          </a:stretch>
+        </p:blipFill>
+        <p:spPr>
+          <a:xfrm>
+            <a:off x="889687" y="3387212"/>
+            <a:ext cx="5353797" cy="257211"/>
+          </a:xfrm>
+          <a:prstGeom prst="rect">
+            <a:avLst/>
+          </a:prstGeom>
+        </p:spPr>
+      </p:pic>
+    </p:spTree>
+    <p:extLst>
+      <p:ext uri="{BB962C8B-B14F-4D97-AF65-F5344CB8AC3E}">
+        <p14:creationId xmlns:p14="http://schemas.microsoft.com/office/powerpoint/2010/main" val="3230294370"/>
+      </p:ext>
+    </p:extLst>
+  </p:cSld>
+  <p:clrMapOvr>
+    <a:masterClrMapping/>
+  </p:clrMapOvr>
+  <mc:AlternateContent xmlns:mc="http://schemas.openxmlformats.org/markup-compatibility/2006" xmlns:p14="http://schemas.microsoft.com/office/powerpoint/2010/main">
+    <mc:Choice Requires="p14">
+      <p:transition spd="med" p14:dur="700">
+        <p:fade/>
+      </p:transition>
+    </mc:Choice>
+    <mc:Fallback xmlns="">
+      <p:transition spd="med">
+        <p:fade/>
+      </p:transition>
+    </mc:Fallback>
+  </mc:AlternateContent>
+</p:sld>
+</file>
+
+<file path=ppt/slides/slide22.xml><?xml version="1.0" encoding="utf-8"?>
+<p:sld xmlns:a="http://schemas.openxmlformats.org/drawingml/2006/main" xmlns:r="http://schemas.openxmlformats.org/officeDocument/2006/relationships" xmlns:p="http://schemas.openxmlformats.org/presentationml/2006/main">
+  <p:cSld>
+    <p:spTree>
+      <p:nvGrpSpPr>
+        <p:cNvPr id="1" name=""/>
+        <p:cNvGrpSpPr/>
+        <p:nvPr/>
+      </p:nvGrpSpPr>
+      <p:grpSpPr>
+        <a:xfrm>
+          <a:off x="0" y="0"/>
+          <a:ext cx="0" cy="0"/>
+          <a:chOff x="0" y="0"/>
+          <a:chExt cx="0" cy="0"/>
+        </a:xfrm>
+      </p:grpSpPr>
+      <p:sp>
+        <p:nvSpPr>
+          <p:cNvPr id="2" name="Title 1">
+            <a:extLst>
+              <a:ext uri="{FF2B5EF4-FFF2-40B4-BE49-F238E27FC236}">
                 <a16:creationId xmlns:a16="http://schemas.microsoft.com/office/drawing/2014/main" id="{3A2DD57E-6DC0-47EC-B5ED-D0BDB5D3DB48}"/>
               </a:ext>
             </a:extLst>
@@ -21311,7 +23539,7 @@
 </p:sld>
 </file>
 
-<file path=ppt/slides/slide21.xml><?xml version="1.0" encoding="utf-8"?>
+<file path=ppt/slides/slide23.xml><?xml version="1.0" encoding="utf-8"?>
 <p:sld xmlns:a="http://schemas.openxmlformats.org/drawingml/2006/main" xmlns:r="http://schemas.openxmlformats.org/officeDocument/2006/relationships" xmlns:p="http://schemas.openxmlformats.org/presentationml/2006/main">
   <p:cSld>
     <p:spTree>
@@ -21781,6 +24009,18 @@
               </a:defRPr>
             </a:lvl9pPr>
           </a:lstStyle>
+          <a:p>
+            <a:pPr marL="0" indent="0" algn="just">
+              <a:lnSpc>
+                <a:spcPct val="150000"/>
+              </a:lnSpc>
+              <a:buNone/>
+            </a:pPr>
+            <a:r>
+              <a:rPr lang="en-US" sz="1400" dirty="0"/>
+              <a:t>Following peer review feedback, we fixed the random seed (seed = 1) to ensure reproducibility of the experiments.</a:t>
+            </a:r>
+          </a:p>
           <a:p>
             <a:pPr marL="0" indent="0" algn="just">
               <a:lnSpc>

</xml_diff>